<commit_message>
user data for EC2 added
</commit_message>
<xml_diff>
--- a/creating-a-vpc-and-deploying-a-web-application/creating-a-vpc-and-deploying-a-web-application.pptx
+++ b/creating-a-vpc-and-deploying-a-web-application/creating-a-vpc-and-deploying-a-web-application.pptx
@@ -33,6 +33,8 @@
     <p:sldId id="275" r:id="rId26"/>
     <p:sldId id="276" r:id="rId27"/>
     <p:sldId id="277" r:id="rId28"/>
+    <p:sldId id="278" r:id="rId29"/>
+    <p:sldId id="279" r:id="rId30"/>
   </p:sldIdLst>
   <p:sldSz cx="9144000" cy="5715000"/>
   <p:notesSz cx="6858000" cy="9144000"/>
@@ -256,7 +258,7 @@
           <a:bodyPr lIns="0" rIns="0" tIns="0" bIns="0" anchor="b"/>
           <a:p>
             <a:pPr algn="r"/>
-            <a:fld id="{8B27A7E6-787D-4F43-BF61-762364CB7508}" type="slidenum">
+            <a:fld id="{22F29C8D-D918-4A20-886B-3FDC3E0F1B19}" type="slidenum">
               <a:rPr b="0" lang="en-US" sz="1400" spc="-1" strike="noStrike">
                 <a:latin typeface="Times New Roman"/>
               </a:rPr>
@@ -293,7 +295,7 @@
       </p:grpSpPr>
       <p:sp>
         <p:nvSpPr>
-          <p:cNvPr id="521" name="PlaceHolder 1"/>
+          <p:cNvPr id="534" name="PlaceHolder 1"/>
           <p:cNvSpPr>
             <a:spLocks noGrp="1"/>
           </p:cNvSpPr>
@@ -313,7 +315,7 @@
       </p:sp>
       <p:sp>
         <p:nvSpPr>
-          <p:cNvPr id="522" name="PlaceHolder 2"/>
+          <p:cNvPr id="535" name="PlaceHolder 2"/>
           <p:cNvSpPr>
             <a:spLocks noGrp="1"/>
           </p:cNvSpPr>
@@ -341,7 +343,7 @@
       </p:sp>
       <p:sp>
         <p:nvSpPr>
-          <p:cNvPr id="523" name="TextShape 3"/>
+          <p:cNvPr id="536" name="TextShape 3"/>
           <p:cNvSpPr txBox="1"/>
           <p:nvPr/>
         </p:nvSpPr>
@@ -366,7 +368,7 @@
                 <a:spcPct val="100000"/>
               </a:lnSpc>
             </a:pPr>
-            <a:fld id="{26C45BCD-134F-4F19-AA38-C757F611FF8F}" type="slidenum">
+            <a:fld id="{E0306A83-A4B6-45EC-99EB-A2E24174033D}" type="slidenum">
               <a:rPr b="0" lang="en-US" sz="1200" spc="-1" strike="noStrike">
                 <a:solidFill>
                   <a:srgbClr val="000000"/>
@@ -6178,7 +6180,61 @@
                 </a:solidFill>
                 <a:latin typeface="Calibri"/>
               </a:rPr>
-              <a:t>Click to edit Master title style</a:t>
+              <a:t>Click </a:t>
+            </a:r>
+            <a:r>
+              <a:rPr b="0" lang="tr-TR" sz="4400" spc="-1" strike="noStrike">
+                <a:solidFill>
+                  <a:srgbClr val="ffffff"/>
+                </a:solidFill>
+                <a:latin typeface="Calibri"/>
+              </a:rPr>
+              <a:t>to </a:t>
+            </a:r>
+            <a:r>
+              <a:rPr b="0" lang="tr-TR" sz="4400" spc="-1" strike="noStrike">
+                <a:solidFill>
+                  <a:srgbClr val="ffffff"/>
+                </a:solidFill>
+                <a:latin typeface="Calibri"/>
+              </a:rPr>
+              <a:t>edit </a:t>
+            </a:r>
+            <a:r>
+              <a:rPr b="0" lang="tr-TR" sz="4400" spc="-1" strike="noStrike">
+                <a:solidFill>
+                  <a:srgbClr val="ffffff"/>
+                </a:solidFill>
+                <a:latin typeface="Calibri"/>
+              </a:rPr>
+              <a:t>Mast</a:t>
+            </a:r>
+            <a:r>
+              <a:rPr b="0" lang="tr-TR" sz="4400" spc="-1" strike="noStrike">
+                <a:solidFill>
+                  <a:srgbClr val="ffffff"/>
+                </a:solidFill>
+                <a:latin typeface="Calibri"/>
+              </a:rPr>
+              <a:t>er </a:t>
+            </a:r>
+            <a:r>
+              <a:rPr b="0" lang="tr-TR" sz="4400" spc="-1" strike="noStrike">
+                <a:solidFill>
+                  <a:srgbClr val="ffffff"/>
+                </a:solidFill>
+                <a:latin typeface="Calibri"/>
+              </a:rPr>
+              <a:t>title </a:t>
+            </a:r>
+            <a:r>
+              <a:rPr b="0" lang="tr-TR" sz="4400" spc="-1" strike="noStrike">
+                <a:solidFill>
+                  <a:srgbClr val="ffffff"/>
+                </a:solidFill>
+                <a:latin typeface="Calibri"/>
+              </a:rPr>
+              <a:t>style</a:t>
             </a:r>
             <a:endParaRPr b="0" lang="tr-TR" sz="4400" spc="-1" strike="noStrike">
               <a:solidFill>
@@ -7050,7 +7106,61 @@
                 </a:solidFill>
                 <a:latin typeface="Calibri"/>
               </a:rPr>
-              <a:t>Click to edit Master title style</a:t>
+              <a:t>Click </a:t>
+            </a:r>
+            <a:r>
+              <a:rPr b="0" lang="tr-TR" sz="4400" spc="-1" strike="noStrike">
+                <a:solidFill>
+                  <a:srgbClr val="ffffff"/>
+                </a:solidFill>
+                <a:latin typeface="Calibri"/>
+              </a:rPr>
+              <a:t>to </a:t>
+            </a:r>
+            <a:r>
+              <a:rPr b="0" lang="tr-TR" sz="4400" spc="-1" strike="noStrike">
+                <a:solidFill>
+                  <a:srgbClr val="ffffff"/>
+                </a:solidFill>
+                <a:latin typeface="Calibri"/>
+              </a:rPr>
+              <a:t>edit </a:t>
+            </a:r>
+            <a:r>
+              <a:rPr b="0" lang="tr-TR" sz="4400" spc="-1" strike="noStrike">
+                <a:solidFill>
+                  <a:srgbClr val="ffffff"/>
+                </a:solidFill>
+                <a:latin typeface="Calibri"/>
+              </a:rPr>
+              <a:t>Mast</a:t>
+            </a:r>
+            <a:r>
+              <a:rPr b="0" lang="tr-TR" sz="4400" spc="-1" strike="noStrike">
+                <a:solidFill>
+                  <a:srgbClr val="ffffff"/>
+                </a:solidFill>
+                <a:latin typeface="Calibri"/>
+              </a:rPr>
+              <a:t>er </a:t>
+            </a:r>
+            <a:r>
+              <a:rPr b="0" lang="tr-TR" sz="4400" spc="-1" strike="noStrike">
+                <a:solidFill>
+                  <a:srgbClr val="ffffff"/>
+                </a:solidFill>
+                <a:latin typeface="Calibri"/>
+              </a:rPr>
+              <a:t>title </a:t>
+            </a:r>
+            <a:r>
+              <a:rPr b="0" lang="tr-TR" sz="4400" spc="-1" strike="noStrike">
+                <a:solidFill>
+                  <a:srgbClr val="ffffff"/>
+                </a:solidFill>
+                <a:latin typeface="Calibri"/>
+              </a:rPr>
+              <a:t>style</a:t>
             </a:r>
             <a:endParaRPr b="0" lang="tr-TR" sz="4400" spc="-1" strike="noStrike">
               <a:solidFill>
@@ -11942,7 +12052,7 @@
             </p:nvSpPr>
             <p:spPr>
               <a:xfrm flipH="1" flipV="1" rot="5400000">
-                <a:off x="3593880" y="2844000"/>
+                <a:off x="3593880" y="2843280"/>
                 <a:ext cx="821160" cy="1005120"/>
               </a:xfrm>
               <a:prstGeom prst="bentConnector3">
@@ -13100,7 +13210,7 @@
         </p:nvSpPr>
         <p:spPr>
           <a:xfrm flipH="1" flipV="1" rot="5400000">
-            <a:off x="3350160" y="2778120"/>
+            <a:off x="3350160" y="2777400"/>
             <a:ext cx="1106280" cy="1215360"/>
           </a:xfrm>
           <a:prstGeom prst="bentConnector3">
@@ -15766,7 +15876,7 @@
         </p:nvSpPr>
         <p:spPr>
           <a:xfrm flipH="1" rot="16200000">
-            <a:off x="4208040" y="3376080"/>
+            <a:off x="4207320" y="3376080"/>
             <a:ext cx="354960" cy="917640"/>
           </a:xfrm>
           <a:prstGeom prst="curvedLeftArrow">
@@ -15928,7 +16038,7 @@
         </p:nvSpPr>
         <p:spPr>
           <a:xfrm flipH="1" rot="16200000">
-            <a:off x="6497280" y="3386880"/>
+            <a:off x="6496560" y="3386880"/>
             <a:ext cx="354960" cy="917640"/>
           </a:xfrm>
           <a:prstGeom prst="curvedLeftArrow">
@@ -17210,7 +17320,7 @@
         </p:nvSpPr>
         <p:spPr>
           <a:xfrm flipH="1">
-            <a:off x="1815480" y="3386520"/>
+            <a:off x="1814760" y="3386520"/>
             <a:ext cx="644760" cy="360"/>
           </a:xfrm>
           <a:custGeom>
@@ -17253,7 +17363,7 @@
         </p:nvSpPr>
         <p:spPr>
           <a:xfrm flipH="1" flipV="1">
-            <a:off x="6176520" y="3731400"/>
+            <a:off x="6176520" y="3730680"/>
             <a:ext cx="471600" cy="270360"/>
           </a:xfrm>
           <a:custGeom>
@@ -17339,7 +17449,7 @@
         </p:nvSpPr>
         <p:spPr>
           <a:xfrm flipH="1">
-            <a:off x="4725000" y="3556800"/>
+            <a:off x="4724280" y="3556800"/>
             <a:ext cx="644760" cy="360"/>
           </a:xfrm>
           <a:custGeom>
@@ -19075,7 +19185,7 @@
                 </a:solidFill>
                 <a:latin typeface="Ubuntu"/>
               </a:rPr>
-              <a:t>EC2 Instance </a:t>
+              <a:t>IAM Groups &amp; Users &amp; Roles </a:t>
             </a:r>
             <a:endParaRPr b="0" lang="tr-TR" sz="4000" spc="-1" strike="noStrike">
               <a:solidFill>
@@ -19120,8 +19230,8 @@
         </p:nvSpPr>
         <p:spPr>
           <a:xfrm>
-            <a:off x="548640" y="3193200"/>
-            <a:ext cx="1387080" cy="811440"/>
+            <a:off x="640080" y="3467520"/>
+            <a:ext cx="1280160" cy="921600"/>
           </a:xfrm>
           <a:prstGeom prst="rect">
             <a:avLst/>
@@ -19153,7 +19263,7 @@
                 <a:latin typeface="Ubuntu"/>
                 <a:ea typeface="Amazon Ember"/>
               </a:rPr>
-              <a:t>   </a:t>
+              <a:t>    </a:t>
             </a:r>
             <a:r>
               <a:rPr b="0" lang="en-US" sz="2400" spc="-1" strike="noStrike">
@@ -19163,7 +19273,7 @@
                 <a:latin typeface="Ubuntu"/>
                 <a:ea typeface="Amazon Ember"/>
               </a:rPr>
-              <a:t>Amazon</a:t>
+              <a:t>AWS</a:t>
             </a:r>
             <a:endParaRPr b="0" lang="en-US" sz="2400" spc="-1" strike="noStrike">
               <a:latin typeface="Arial"/>
@@ -19183,7 +19293,7 @@
                 <a:latin typeface="Ubuntu"/>
                 <a:ea typeface="Amazon Ember"/>
               </a:rPr>
-              <a:t>       </a:t>
+              <a:t>     </a:t>
             </a:r>
             <a:r>
               <a:rPr b="0" lang="en-US" sz="2400" spc="-1" strike="noStrike">
@@ -19193,7 +19303,7 @@
                 <a:latin typeface="Ubuntu"/>
                 <a:ea typeface="Amazon Ember"/>
               </a:rPr>
-              <a:t>EC2</a:t>
+              <a:t>IAM</a:t>
             </a:r>
             <a:endParaRPr b="0" lang="en-US" sz="2400" spc="-1" strike="noStrike">
               <a:latin typeface="Arial"/>
@@ -19218,7 +19328,7 @@
           <a:noFill/>
           <a:ln w="50760">
             <a:solidFill>
-              <a:srgbClr val="ed7d31"/>
+              <a:srgbClr val="407927"/>
             </a:solidFill>
             <a:round/>
           </a:ln>
@@ -19230,9 +19340,160 @@
           <a:fontRef idx="minor"/>
         </p:style>
       </p:sp>
+      <p:sp>
+        <p:nvSpPr>
+          <p:cNvPr id="468" name="TextShape 5"/>
+          <p:cNvSpPr txBox="1"/>
+          <p:nvPr/>
+        </p:nvSpPr>
+        <p:spPr>
+          <a:xfrm>
+            <a:off x="2468880" y="1371600"/>
+            <a:ext cx="6492240" cy="3391560"/>
+          </a:xfrm>
+          <a:prstGeom prst="rect">
+            <a:avLst/>
+          </a:prstGeom>
+          <a:noFill/>
+          <a:ln>
+            <a:noFill/>
+          </a:ln>
+        </p:spPr>
+        <p:txBody>
+          <a:bodyPr lIns="90000" rIns="90000" tIns="45000" bIns="45000"/>
+          <a:p>
+            <a:pPr marL="216000" indent="-216000">
+              <a:spcAft>
+                <a:spcPts val="575"/>
+              </a:spcAft>
+              <a:buClr>
+                <a:srgbClr val="000000"/>
+              </a:buClr>
+              <a:buSzPct val="45000"/>
+              <a:buFont typeface="Wingdings" charset="2"/>
+              <a:buChar char=""/>
+            </a:pPr>
+            <a:r>
+              <a:rPr b="0" lang="en-US" sz="1500" spc="-1" strike="noStrike">
+                <a:latin typeface="Ubuntu"/>
+              </a:rPr>
+              <a:t>AWS Identity and Access Management (IAM) ile AWS hizmetlerine ve kaynaklarına erişimi güvenli bir şekilde yönetebiliriz.</a:t>
+            </a:r>
+            <a:endParaRPr b="0" lang="en-US" sz="1500" spc="-1" strike="noStrike">
+              <a:latin typeface="Arial"/>
+            </a:endParaRPr>
+          </a:p>
+          <a:p>
+            <a:pPr marL="216000" indent="-216000">
+              <a:spcAft>
+                <a:spcPts val="575"/>
+              </a:spcAft>
+              <a:buClr>
+                <a:srgbClr val="000000"/>
+              </a:buClr>
+              <a:buSzPct val="45000"/>
+              <a:buFont typeface="Wingdings" charset="2"/>
+              <a:buChar char=""/>
+            </a:pPr>
+            <a:r>
+              <a:rPr b="0" lang="en-US" sz="1500" spc="-1" strike="noStrike">
+                <a:latin typeface="Ubuntu"/>
+              </a:rPr>
+              <a:t>IAM hizmetini kullanarak AWS kullanıcıları ve grupları oluşturup bunları yönetebilir ve izinleri kullanarak AWS kaynaklarına erişimlerine izin verebilir ya da erişimlerini reddedebiliriz. </a:t>
+            </a:r>
+            <a:endParaRPr b="0" lang="en-US" sz="1500" spc="-1" strike="noStrike">
+              <a:latin typeface="Arial"/>
+            </a:endParaRPr>
+          </a:p>
+          <a:p>
+            <a:pPr marL="216000" indent="-216000">
+              <a:spcAft>
+                <a:spcPts val="575"/>
+              </a:spcAft>
+              <a:buClr>
+                <a:srgbClr val="000000"/>
+              </a:buClr>
+              <a:buSzPct val="45000"/>
+              <a:buFont typeface="Wingdings" charset="2"/>
+              <a:buChar char=""/>
+            </a:pPr>
+            <a:r>
+              <a:rPr b="1" lang="en-US" sz="1500" spc="-1" strike="noStrike">
+                <a:latin typeface="Ubuntu"/>
+              </a:rPr>
+              <a:t>IAM User :</a:t>
+            </a:r>
+            <a:r>
+              <a:rPr b="0" lang="en-US" sz="1500" spc="-1" strike="noStrike">
+                <a:latin typeface="Ubuntu"/>
+              </a:rPr>
+              <a:t> AWS’de oluşturduğumuz kullanıcılardır. Kullanıcılar AWS ile iletişim kuran sistemimizde tanımlı bir kişiyi ya da bir servisi ifade edebilir. </a:t>
+            </a:r>
+            <a:endParaRPr b="0" lang="en-US" sz="1500" spc="-1" strike="noStrike">
+              <a:latin typeface="Arial"/>
+            </a:endParaRPr>
+          </a:p>
+          <a:p>
+            <a:pPr marL="216000" indent="-216000">
+              <a:spcAft>
+                <a:spcPts val="575"/>
+              </a:spcAft>
+              <a:buClr>
+                <a:srgbClr val="000000"/>
+              </a:buClr>
+              <a:buSzPct val="45000"/>
+              <a:buFont typeface="Wingdings" charset="2"/>
+              <a:buChar char=""/>
+            </a:pPr>
+            <a:r>
+              <a:rPr b="1" lang="en-US" sz="1500" spc="-1" strike="noStrike">
+                <a:latin typeface="Ubuntu"/>
+              </a:rPr>
+              <a:t>IAM Groups :</a:t>
+            </a:r>
+            <a:r>
+              <a:rPr b="0" lang="en-US" sz="1500" spc="-1" strike="noStrike">
+                <a:latin typeface="Ubuntu"/>
+              </a:rPr>
+              <a:t> Birden fazla IAM user’ından oluşur. Sistemde bulunan birden fazla kişiye kolaylıkla hakların tanımlanmasını ve kullanıcıların daha kolay yönetilmesini sağlar.</a:t>
+            </a:r>
+            <a:endParaRPr b="0" lang="en-US" sz="1500" spc="-1" strike="noStrike">
+              <a:latin typeface="Arial"/>
+            </a:endParaRPr>
+          </a:p>
+          <a:p>
+            <a:pPr marL="216000" indent="-216000">
+              <a:spcAft>
+                <a:spcPts val="575"/>
+              </a:spcAft>
+              <a:buClr>
+                <a:srgbClr val="000000"/>
+              </a:buClr>
+              <a:buSzPct val="45000"/>
+              <a:buFont typeface="Wingdings" charset="2"/>
+              <a:buChar char=""/>
+            </a:pPr>
+            <a:r>
+              <a:rPr b="1" lang="en-US" sz="1500" spc="-1" strike="noStrike">
+                <a:latin typeface="Ubuntu"/>
+              </a:rPr>
+              <a:t>IAM Roles :</a:t>
+            </a:r>
+            <a:r>
+              <a:rPr b="0" lang="en-US" sz="1500" spc="-1" strike="noStrike">
+                <a:latin typeface="Ubuntu"/>
+              </a:rPr>
+              <a:t> IAM role’ü user’a çok benzeyen bir kavramdır. User’dan tek farkı, role’lerin kendilerine ait şifreleri ya da access/secret key’lerinin olmamasıdır.</a:t>
+            </a:r>
+            <a:endParaRPr b="0" lang="en-US" sz="1500" spc="-1" strike="noStrike">
+              <a:latin typeface="Arial"/>
+            </a:endParaRPr>
+          </a:p>
+        </p:txBody>
+      </p:sp>
       <p:pic>
         <p:nvPicPr>
-          <p:cNvPr id="468" name="Picture 17" descr=""/>
+          <p:cNvPr id="469" name="Picture 4" descr=""/>
           <p:cNvPicPr/>
           <p:nvPr/>
         </p:nvPicPr>
@@ -19242,8 +19503,8 @@
         </p:blipFill>
         <p:spPr>
           <a:xfrm>
-            <a:off x="890640" y="2137320"/>
-            <a:ext cx="791280" cy="949680"/>
+            <a:off x="986400" y="2137320"/>
+            <a:ext cx="642600" cy="1217880"/>
           </a:xfrm>
           <a:prstGeom prst="rect">
             <a:avLst/>
@@ -19253,112 +19514,6 @@
           </a:ln>
         </p:spPr>
       </p:pic>
-      <p:sp>
-        <p:nvSpPr>
-          <p:cNvPr id="469" name="TextShape 5"/>
-          <p:cNvSpPr txBox="1"/>
-          <p:nvPr/>
-        </p:nvSpPr>
-        <p:spPr>
-          <a:xfrm>
-            <a:off x="2468880" y="1483920"/>
-            <a:ext cx="6492240" cy="3270960"/>
-          </a:xfrm>
-          <a:prstGeom prst="rect">
-            <a:avLst/>
-          </a:prstGeom>
-          <a:noFill/>
-          <a:ln>
-            <a:noFill/>
-          </a:ln>
-        </p:spPr>
-        <p:txBody>
-          <a:bodyPr lIns="90000" rIns="90000" tIns="45000" bIns="45000"/>
-          <a:p>
-            <a:pPr marL="216000" indent="-216000">
-              <a:buClr>
-                <a:srgbClr val="000000"/>
-              </a:buClr>
-              <a:buSzPct val="45000"/>
-              <a:buFont typeface="Wingdings" charset="2"/>
-              <a:buChar char=""/>
-            </a:pPr>
-            <a:r>
-              <a:rPr b="0" lang="en-US" sz="1500" spc="-1" strike="noStrike">
-                <a:latin typeface="Ubuntu"/>
-              </a:rPr>
-              <a:t>AWS içinde sunucu hizmeti olarak kullanılmaktadır. Web hosting, Database sunucusu, authentication sunucusu gibi bir çok şekilde kullanılabilirler.</a:t>
-            </a:r>
-            <a:endParaRPr b="0" lang="en-US" sz="1500" spc="-1" strike="noStrike">
-              <a:latin typeface="Arial"/>
-            </a:endParaRPr>
-          </a:p>
-          <a:p>
-            <a:pPr marL="216000" indent="-216000">
-              <a:buClr>
-                <a:srgbClr val="000000"/>
-              </a:buClr>
-              <a:buSzPct val="45000"/>
-              <a:buFont typeface="Wingdings" charset="2"/>
-              <a:buChar char=""/>
-            </a:pPr>
-            <a:endParaRPr b="0" lang="en-US" sz="1500" spc="-1" strike="noStrike">
-              <a:latin typeface="Arial"/>
-            </a:endParaRPr>
-          </a:p>
-          <a:p>
-            <a:pPr marL="216000" indent="-216000">
-              <a:buClr>
-                <a:srgbClr val="000000"/>
-              </a:buClr>
-              <a:buSzPct val="45000"/>
-              <a:buFont typeface="Wingdings" charset="2"/>
-              <a:buChar char=""/>
-            </a:pPr>
-            <a:r>
-              <a:rPr b="0" lang="en-US" sz="1500" spc="-1" strike="noStrike">
-                <a:latin typeface="Ubuntu"/>
-              </a:rPr>
-              <a:t>AMI adı verilen ön tanımlı imajlardan oluşturulurlar. Bu imajlar sunucunun fiziksel özelliklerini barındırır ve tekrar tekrar kullanılabilirliği arttırırlar. </a:t>
-            </a:r>
-            <a:endParaRPr b="0" lang="en-US" sz="1500" spc="-1" strike="noStrike">
-              <a:latin typeface="Arial"/>
-            </a:endParaRPr>
-          </a:p>
-          <a:p>
-            <a:pPr marL="216000" indent="-216000">
-              <a:buClr>
-                <a:srgbClr val="000000"/>
-              </a:buClr>
-              <a:buSzPct val="45000"/>
-              <a:buFont typeface="Wingdings" charset="2"/>
-              <a:buChar char=""/>
-            </a:pPr>
-            <a:endParaRPr b="0" lang="en-US" sz="1500" spc="-1" strike="noStrike">
-              <a:latin typeface="Arial"/>
-            </a:endParaRPr>
-          </a:p>
-          <a:p>
-            <a:pPr marL="216000" indent="-216000">
-              <a:buClr>
-                <a:srgbClr val="000000"/>
-              </a:buClr>
-              <a:buSzPct val="45000"/>
-              <a:buFont typeface="Wingdings" charset="2"/>
-              <a:buChar char=""/>
-            </a:pPr>
-            <a:r>
-              <a:rPr b="0" lang="en-US" sz="1500" spc="-1" strike="noStrike">
-                <a:latin typeface="Ubuntu"/>
-              </a:rPr>
-              <a:t>EC2 lar tipleri ve büyüklüklüklerine göre kategorilendirilirler. Tip olarak kullanım alanlarına göre General Purpose , Compute optimized, Memory Optimized, Accelerated Computing, Storage Optimized olarak ayrılırlar. Büyüklük olarak large , xlarge, 2xlarge gibi kategorilendirmeleri vardır.</a:t>
-            </a:r>
-            <a:endParaRPr b="0" lang="en-US" sz="1500" spc="-1" strike="noStrike">
-              <a:latin typeface="Arial"/>
-            </a:endParaRPr>
-          </a:p>
-        </p:txBody>
-      </p:sp>
     </p:spTree>
   </p:cSld>
   <p:transition spd="slow">
@@ -19447,7 +19602,7 @@
                 </a:solidFill>
                 <a:latin typeface="Ubuntu"/>
               </a:rPr>
-              <a:t>EC2 Instance – User Data </a:t>
+              <a:t>EC2 Instance </a:t>
             </a:r>
             <a:endParaRPr b="0" lang="tr-TR" sz="4000" spc="-1" strike="noStrike">
               <a:solidFill>
@@ -19633,8 +19788,8 @@
         </p:nvSpPr>
         <p:spPr>
           <a:xfrm>
-            <a:off x="2432880" y="1408680"/>
-            <a:ext cx="6492240" cy="2066040"/>
+            <a:off x="2468880" y="1200960"/>
+            <a:ext cx="6492240" cy="3828240"/>
           </a:xfrm>
           <a:prstGeom prst="rect">
             <a:avLst/>
@@ -19648,9 +19803,6 @@
           <a:bodyPr lIns="90000" rIns="90000" tIns="45000" bIns="45000"/>
           <a:p>
             <a:pPr marL="216000" indent="-216000">
-              <a:spcAft>
-                <a:spcPts val="1009"/>
-              </a:spcAft>
               <a:buClr>
                 <a:srgbClr val="000000"/>
               </a:buClr>
@@ -19662,7 +19814,7 @@
               <a:rPr b="0" lang="en-US" sz="1500" spc="-1" strike="noStrike">
                 <a:latin typeface="Ubuntu"/>
               </a:rPr>
-              <a:t>EBS olarak adlandırılan disk alanları ile kalıcı datanın tutulmasını sağlayabilirler. Her EC2 instance içinde en az 1 adet root volume olarak EBS kullanılması gerekmektedir.</a:t>
+              <a:t>AWS içinde sunucu hizmeti olarak kullanılmaktadır. Web hosting, Database sunucusu, authentication sunucusu gibi bir çok şekilde kullanılabilirler.</a:t>
             </a:r>
             <a:endParaRPr b="0" lang="en-US" sz="1500" spc="-1" strike="noStrike">
               <a:latin typeface="Arial"/>
@@ -19670,9 +19822,6 @@
           </a:p>
           <a:p>
             <a:pPr marL="216000" indent="-216000">
-              <a:spcAft>
-                <a:spcPts val="1009"/>
-              </a:spcAft>
               <a:buClr>
                 <a:srgbClr val="000000"/>
               </a:buClr>
@@ -19680,21 +19829,12 @@
               <a:buFont typeface="Wingdings" charset="2"/>
               <a:buChar char=""/>
             </a:pPr>
-            <a:r>
-              <a:rPr b="0" lang="en-US" sz="1500" spc="-1" strike="noStrike">
-                <a:latin typeface="Ubuntu"/>
-              </a:rPr>
-              <a:t>EC2 instancelar oluşturulurken yapılmak istenen extra ayarlamalar ve konfigurasyonlar User Data denilen text dosyaları ile sağlanmaktadır.</a:t>
-            </a:r>
             <a:endParaRPr b="0" lang="en-US" sz="1500" spc="-1" strike="noStrike">
               <a:latin typeface="Arial"/>
             </a:endParaRPr>
           </a:p>
           <a:p>
             <a:pPr marL="216000" indent="-216000">
-              <a:spcAft>
-                <a:spcPts val="1009"/>
-              </a:spcAft>
               <a:buClr>
                 <a:srgbClr val="000000"/>
               </a:buClr>
@@ -19706,24 +19846,518 @@
               <a:rPr b="0" lang="en-US" sz="1500" spc="-1" strike="noStrike">
                 <a:latin typeface="Ubuntu"/>
               </a:rPr>
-              <a:t>Örneğin EC2 instance oluşturulurken bir web sunucusu ayağa kaldırmak istiyorsak User Data kullanarak https servisini kurup aktif hale getirebiliriz.</a:t>
+              <a:t>AMI adı verilen ön tanımlı imajlardan oluşturulurlar. Bu imajlar sunucunun fiziksel özelliklerini barındırır ve tekrar tekrar kullanılabilirliği arttırırlar. </a:t>
             </a:r>
             <a:endParaRPr b="0" lang="en-US" sz="1500" spc="-1" strike="noStrike">
               <a:latin typeface="Arial"/>
             </a:endParaRPr>
           </a:p>
+          <a:p>
+            <a:pPr marL="216000" indent="-216000">
+              <a:buClr>
+                <a:srgbClr val="000000"/>
+              </a:buClr>
+              <a:buSzPct val="45000"/>
+              <a:buFont typeface="Wingdings" charset="2"/>
+              <a:buChar char=""/>
+            </a:pPr>
+            <a:endParaRPr b="0" lang="en-US" sz="1500" spc="-1" strike="noStrike">
+              <a:latin typeface="Arial"/>
+            </a:endParaRPr>
+          </a:p>
+          <a:p>
+            <a:pPr marL="216000" indent="-216000">
+              <a:buClr>
+                <a:srgbClr val="000000"/>
+              </a:buClr>
+              <a:buSzPct val="45000"/>
+              <a:buFont typeface="Wingdings" charset="2"/>
+              <a:buChar char=""/>
+            </a:pPr>
+            <a:r>
+              <a:rPr b="0" lang="en-US" sz="1500" spc="-1" strike="noStrike">
+                <a:latin typeface="Ubuntu"/>
+              </a:rPr>
+              <a:t>EC2 lar tipleri ve büyüklüklüklerine göre kategorilendirilirler. Tip olarak kullanım alanlarına göre General Purpose , Compute optimized, Memory Optimized, Accelerated Computing, Storage Optimized olarak ayrılırlar. Büyüklük olarak large , xlarge, 2xlarge gibi kategorilendirmeleri vardır.</a:t>
+            </a:r>
+            <a:endParaRPr b="0" lang="en-US" sz="1500" spc="-1" strike="noStrike">
+              <a:latin typeface="Arial"/>
+            </a:endParaRPr>
+          </a:p>
+          <a:p>
+            <a:pPr marL="216000" indent="-216000">
+              <a:buClr>
+                <a:srgbClr val="000000"/>
+              </a:buClr>
+              <a:buSzPct val="45000"/>
+              <a:buFont typeface="Wingdings" charset="2"/>
+              <a:buChar char=""/>
+            </a:pPr>
+            <a:endParaRPr b="0" lang="en-US" sz="1500" spc="-1" strike="noStrike">
+              <a:latin typeface="Arial"/>
+            </a:endParaRPr>
+          </a:p>
+          <a:p>
+            <a:pPr marL="216000" indent="-216000">
+              <a:buClr>
+                <a:srgbClr val="000000"/>
+              </a:buClr>
+              <a:buSzPct val="45000"/>
+              <a:buFont typeface="Wingdings" charset="2"/>
+              <a:buChar char=""/>
+            </a:pPr>
+            <a:r>
+              <a:rPr b="0" lang="en-US" sz="1500" spc="-1" strike="noStrike">
+                <a:latin typeface="Ubuntu"/>
+              </a:rPr>
+              <a:t>EBS olarak adlandırılan disk alanları ile kalıcı datanın tutulmasını sağlayabilirler. Her EC2 instance içinde en az 1 adet root volume olarak EBS kullanılması gerekmektedir.</a:t>
+            </a:r>
+            <a:endParaRPr b="0" lang="en-US" sz="1500" spc="-1" strike="noStrike">
+              <a:latin typeface="Arial"/>
+            </a:endParaRPr>
+          </a:p>
         </p:txBody>
       </p:sp>
-      <p:sp>
-        <p:nvSpPr>
-          <p:cNvPr id="476" name="CustomShape 6"/>
+    </p:spTree>
+  </p:cSld>
+  <p:transition spd="slow">
+    <p:push dir="u"/>
+  </p:transition>
+  <p:timing>
+    <p:tnLst>
+      <p:par>
+        <p:cTn id="37" dur="indefinite" restart="never" nodeType="tmRoot">
+          <p:childTnLst>
+            <p:seq>
+              <p:cTn id="38" dur="indefinite" nodeType="mainSeq"/>
+              <p:prevCondLst>
+                <p:cond delay="0" evt="onPrev">
+                  <p:tgtEl>
+                    <p:sldTgt/>
+                  </p:tgtEl>
+                </p:cond>
+              </p:prevCondLst>
+              <p:nextCondLst>
+                <p:cond delay="0" evt="onNext">
+                  <p:tgtEl>
+                    <p:sldTgt/>
+                  </p:tgtEl>
+                </p:cond>
+              </p:nextCondLst>
+            </p:seq>
+          </p:childTnLst>
+        </p:cTn>
+      </p:par>
+    </p:tnLst>
+  </p:timing>
+</p:sld>
+</file>
+
+<file path=ppt/slides/slide2.xml><?xml version="1.0" encoding="utf-8"?>
+<p:sld xmlns:a="http://schemas.openxmlformats.org/drawingml/2006/main" xmlns:p="http://schemas.openxmlformats.org/presentationml/2006/main" xmlns:r="http://schemas.openxmlformats.org/officeDocument/2006/relationships" xmlns:p14="http://schemas.microsoft.com/office/powerpoint/2010/main" xmlns:p15="http://schemas.microsoft.com/office/powerpoint/2012/main" xmlns:mc="http://schemas.openxmlformats.org/markup-compatibility/2006">
+  <p:cSld>
+    <p:spTree>
+      <p:nvGrpSpPr>
+        <p:cNvPr id="1" name=""/>
+        <p:cNvGrpSpPr/>
+        <p:nvPr/>
+      </p:nvGrpSpPr>
+      <p:grpSpPr>
+        <a:xfrm>
+          <a:off x="0" y="0"/>
+          <a:ext cx="0" cy="0"/>
+          <a:chOff x="0" y="0"/>
+          <a:chExt cx="0" cy="0"/>
+        </a:xfrm>
+      </p:grpSpPr>
+      <p:sp>
+        <p:nvSpPr>
+          <p:cNvPr id="201" name="TextShape 1"/>
+          <p:cNvSpPr txBox="1"/>
+          <p:nvPr/>
+        </p:nvSpPr>
+        <p:spPr>
+          <a:xfrm>
+            <a:off x="467640" y="0"/>
+            <a:ext cx="8208720" cy="1200960"/>
+          </a:xfrm>
+          <a:prstGeom prst="rect">
+            <a:avLst/>
+          </a:prstGeom>
+          <a:noFill/>
+          <a:ln>
+            <a:noFill/>
+          </a:ln>
+        </p:spPr>
+        <p:txBody>
+          <a:bodyPr anchor="ctr">
+            <a:normAutofit/>
+          </a:bodyPr>
+          <a:p>
+            <a:r>
+              <a:rPr b="0" lang="tr-TR" sz="4000" spc="-1" strike="noStrike">
+                <a:solidFill>
+                  <a:srgbClr val="ffffff"/>
+                </a:solidFill>
+                <a:latin typeface="Ubuntu"/>
+              </a:rPr>
+              <a:t>Moderator Bilgileri</a:t>
+            </a:r>
+            <a:endParaRPr b="0" lang="tr-TR" sz="4000" spc="-1" strike="noStrike">
+              <a:solidFill>
+                <a:srgbClr val="000000"/>
+              </a:solidFill>
+              <a:latin typeface="Calibri"/>
+            </a:endParaRPr>
+          </a:p>
+        </p:txBody>
+      </p:sp>
+      <p:sp>
+        <p:nvSpPr>
+          <p:cNvPr id="202" name="TextShape 2"/>
+          <p:cNvSpPr txBox="1"/>
+          <p:nvPr/>
+        </p:nvSpPr>
+        <p:spPr>
+          <a:xfrm>
+            <a:off x="182880" y="1371600"/>
+            <a:ext cx="8722800" cy="3497760"/>
+          </a:xfrm>
+          <a:prstGeom prst="rect">
+            <a:avLst/>
+          </a:prstGeom>
+          <a:solidFill>
+            <a:srgbClr val="ffffff"/>
+          </a:solidFill>
+          <a:ln>
+            <a:solidFill>
+              <a:srgbClr val="3465a4"/>
+            </a:solidFill>
+          </a:ln>
+        </p:spPr>
+        <p:txBody>
+          <a:bodyPr lIns="90000" rIns="90000" tIns="45000" bIns="45000"/>
+          <a:p>
+            <a:r>
+              <a:rPr b="1" lang="en-US" sz="1600" spc="-1" strike="noStrike">
+                <a:latin typeface="Ubuntu"/>
+              </a:rPr>
+              <a:t>Serkan BİNGÖL – </a:t>
+            </a:r>
+            <a:r>
+              <a:rPr b="0" lang="en-US" sz="1600" spc="-1" strike="noStrike">
+                <a:latin typeface="Ubuntu"/>
+              </a:rPr>
+              <a:t>Technical Team Lead</a:t>
+            </a:r>
+            <a:endParaRPr b="0" lang="en-US" sz="1600" spc="-1" strike="noStrike">
+              <a:latin typeface="Arial"/>
+            </a:endParaRPr>
+          </a:p>
+          <a:p>
+            <a:r>
+              <a:rPr b="0" lang="en-US" sz="1600" spc="-1" strike="noStrike">
+                <a:latin typeface="Ubuntu"/>
+              </a:rPr>
+              <a:t>AWS Certified Solution Architect , MCSD, MCT</a:t>
+            </a:r>
+            <a:endParaRPr b="0" lang="en-US" sz="1600" spc="-1" strike="noStrike">
+              <a:latin typeface="Arial"/>
+            </a:endParaRPr>
+          </a:p>
+          <a:p>
+            <a:endParaRPr b="0" lang="en-US" sz="1600" spc="-1" strike="noStrike">
+              <a:latin typeface="Arial"/>
+            </a:endParaRPr>
+          </a:p>
+          <a:p>
+            <a:r>
+              <a:rPr b="0" lang="en-US" sz="1600" spc="-1" strike="noStrike">
+                <a:latin typeface="Ubuntu"/>
+              </a:rPr>
+              <a:t>Mail :         </a:t>
+            </a:r>
+            <a:r>
+              <a:rPr b="0" lang="en-US" sz="1600" spc="-1" strike="noStrike">
+                <a:latin typeface="Ubuntu"/>
+                <a:hlinkClick r:id="rId1"/>
+              </a:rPr>
+              <a:t>serkan.bingol@bilgeadam.com</a:t>
+            </a:r>
+            <a:endParaRPr b="0" lang="en-US" sz="1600" spc="-1" strike="noStrike">
+              <a:latin typeface="Arial"/>
+            </a:endParaRPr>
+          </a:p>
+          <a:p>
+            <a:r>
+              <a:rPr b="0" lang="en-US" sz="1600" spc="-1" strike="noStrike">
+                <a:latin typeface="Ubuntu"/>
+              </a:rPr>
+              <a:t>Linkedin : </a:t>
+            </a:r>
+            <a:r>
+              <a:rPr b="0" lang="en-US" sz="1600" spc="-1" strike="noStrike">
+                <a:latin typeface="Ubuntu"/>
+                <a:hlinkClick r:id="rId2"/>
+              </a:rPr>
+              <a:t>https://www.linkedin.com/in/sbingol/</a:t>
+            </a:r>
+            <a:endParaRPr b="0" lang="en-US" sz="1600" spc="-1" strike="noStrike">
+              <a:latin typeface="Arial"/>
+            </a:endParaRPr>
+          </a:p>
+          <a:p>
+            <a:r>
+              <a:rPr b="0" lang="en-US" sz="1600" spc="-1" strike="noStrike">
+                <a:latin typeface="Ubuntu"/>
+              </a:rPr>
+              <a:t>Github :    </a:t>
+            </a:r>
+            <a:r>
+              <a:rPr b="0" lang="en-US" sz="1600" spc="-1" strike="noStrike">
+                <a:latin typeface="Ubuntu"/>
+                <a:hlinkClick r:id="rId3"/>
+              </a:rPr>
+              <a:t>https://github.com/serkanbingol</a:t>
+            </a:r>
+            <a:endParaRPr b="0" lang="en-US" sz="1600" spc="-1" strike="noStrike">
+              <a:latin typeface="Arial"/>
+            </a:endParaRPr>
+          </a:p>
+          <a:p>
+            <a:r>
+              <a:rPr b="0" lang="en-US" sz="1600" spc="-1" strike="noStrike">
+                <a:latin typeface="Ubuntu"/>
+              </a:rPr>
+              <a:t>Medium : </a:t>
+            </a:r>
+            <a:r>
+              <a:rPr b="0" lang="en-US" sz="1600" spc="-1" strike="noStrike">
+                <a:latin typeface="Ubuntu"/>
+                <a:hlinkClick r:id="rId4"/>
+              </a:rPr>
+              <a:t>https://medium.com/@serkanbingoll</a:t>
+            </a:r>
+            <a:endParaRPr b="0" lang="en-US" sz="1600" spc="-1" strike="noStrike">
+              <a:latin typeface="Arial"/>
+            </a:endParaRPr>
+          </a:p>
+          <a:p>
+            <a:endParaRPr b="0" lang="en-US" sz="1600" spc="-1" strike="noStrike">
+              <a:latin typeface="Arial"/>
+            </a:endParaRPr>
+          </a:p>
+          <a:p>
+            <a:r>
+              <a:rPr b="1" lang="en-US" sz="1600" spc="-1" strike="noStrike">
+                <a:latin typeface="Ubuntu"/>
+              </a:rPr>
+              <a:t>Bilgeadam Hesapları</a:t>
+            </a:r>
+            <a:endParaRPr b="0" lang="en-US" sz="1600" spc="-1" strike="noStrike">
+              <a:latin typeface="Arial"/>
+            </a:endParaRPr>
+          </a:p>
+          <a:p>
+            <a:endParaRPr b="0" lang="en-US" sz="1600" spc="-1" strike="noStrike">
+              <a:latin typeface="Arial"/>
+            </a:endParaRPr>
+          </a:p>
+          <a:p>
+            <a:r>
+              <a:rPr b="0" lang="en-US" sz="1600" spc="-1" strike="noStrike">
+                <a:latin typeface="Ubuntu"/>
+              </a:rPr>
+              <a:t>Web :        </a:t>
+            </a:r>
+            <a:r>
+              <a:rPr b="0" lang="en-US" sz="1600" spc="-1" strike="noStrike">
+                <a:latin typeface="Ubuntu"/>
+                <a:hlinkClick r:id="rId5"/>
+              </a:rPr>
+              <a:t>https://www.bilgeadam.com/</a:t>
+            </a:r>
+            <a:r>
+              <a:rPr b="0" lang="en-US" sz="1600" spc="-1" strike="noStrike">
+                <a:latin typeface="Ubuntu"/>
+              </a:rPr>
+              <a:t>   </a:t>
+            </a:r>
+            <a:endParaRPr b="0" lang="en-US" sz="1600" spc="-1" strike="noStrike">
+              <a:latin typeface="Arial"/>
+            </a:endParaRPr>
+          </a:p>
+          <a:p>
+            <a:r>
+              <a:rPr b="0" lang="en-US" sz="1600" spc="-1" strike="noStrike">
+                <a:latin typeface="Ubuntu"/>
+              </a:rPr>
+              <a:t>Linkedin : </a:t>
+            </a:r>
+            <a:r>
+              <a:rPr b="0" lang="en-US" sz="1600" spc="-1" strike="noStrike">
+                <a:latin typeface="Ubuntu"/>
+                <a:hlinkClick r:id="rId6"/>
+              </a:rPr>
+              <a:t>https://www.linkedin.com/company/bilge-adam/</a:t>
+            </a:r>
+            <a:endParaRPr b="0" lang="en-US" sz="1600" spc="-1" strike="noStrike">
+              <a:latin typeface="Arial"/>
+            </a:endParaRPr>
+          </a:p>
+          <a:p>
+            <a:r>
+              <a:rPr b="0" lang="en-US" sz="1600" spc="-1" strike="noStrike">
+                <a:latin typeface="Ubuntu"/>
+              </a:rPr>
+              <a:t>Twitter :   </a:t>
+            </a:r>
+            <a:r>
+              <a:rPr b="0" lang="en-US" sz="1600" spc="-1" strike="noStrike">
+                <a:latin typeface="Ubuntu"/>
+                <a:hlinkClick r:id="rId7"/>
+              </a:rPr>
+              <a:t>https://twitter.com/bilgeadam</a:t>
+            </a:r>
+            <a:endParaRPr b="0" lang="en-US" sz="1600" spc="-1" strike="noStrike">
+              <a:latin typeface="Arial"/>
+            </a:endParaRPr>
+          </a:p>
+          <a:p>
+            <a:r>
+              <a:rPr b="0" lang="en-US" sz="1600" spc="-1" strike="noStrike">
+                <a:latin typeface="Ubuntu"/>
+                <a:ea typeface="Noto Sans CJK SC"/>
+              </a:rPr>
+              <a:t>Medium : </a:t>
+            </a:r>
+            <a:r>
+              <a:rPr b="0" lang="en-US" sz="1600" spc="-1" strike="noStrike">
+                <a:latin typeface="Ubuntu"/>
+                <a:hlinkClick r:id="rId8"/>
+              </a:rPr>
+              <a:t>https://medium.com/batech</a:t>
+            </a:r>
+            <a:endParaRPr b="0" lang="en-US" sz="1600" spc="-1" strike="noStrike">
+              <a:latin typeface="Arial"/>
+            </a:endParaRPr>
+          </a:p>
+          <a:p>
+            <a:endParaRPr b="0" lang="en-US" sz="1600" spc="-1" strike="noStrike">
+              <a:latin typeface="Arial"/>
+            </a:endParaRPr>
+          </a:p>
+        </p:txBody>
+      </p:sp>
+    </p:spTree>
+  </p:cSld>
+  <p:transition spd="slow">
+    <p:push dir="u"/>
+  </p:transition>
+  <p:timing>
+    <p:tnLst>
+      <p:par>
+        <p:cTn id="3" dur="indefinite" restart="never" nodeType="tmRoot">
+          <p:childTnLst>
+            <p:seq>
+              <p:cTn id="4" dur="indefinite" nodeType="mainSeq"/>
+              <p:prevCondLst>
+                <p:cond delay="0" evt="onPrev">
+                  <p:tgtEl>
+                    <p:sldTgt/>
+                  </p:tgtEl>
+                </p:cond>
+              </p:prevCondLst>
+              <p:nextCondLst>
+                <p:cond delay="0" evt="onNext">
+                  <p:tgtEl>
+                    <p:sldTgt/>
+                  </p:tgtEl>
+                </p:cond>
+              </p:nextCondLst>
+            </p:seq>
+          </p:childTnLst>
+        </p:cTn>
+      </p:par>
+    </p:tnLst>
+  </p:timing>
+</p:sld>
+</file>
+
+<file path=ppt/slides/slide20.xml><?xml version="1.0" encoding="utf-8"?>
+<p:sld xmlns:a="http://schemas.openxmlformats.org/drawingml/2006/main" xmlns:p="http://schemas.openxmlformats.org/presentationml/2006/main" xmlns:r="http://schemas.openxmlformats.org/officeDocument/2006/relationships" xmlns:p14="http://schemas.microsoft.com/office/powerpoint/2010/main" xmlns:p15="http://schemas.microsoft.com/office/powerpoint/2012/main" xmlns:mc="http://schemas.openxmlformats.org/markup-compatibility/2006">
+  <p:cSld>
+    <p:spTree>
+      <p:nvGrpSpPr>
+        <p:cNvPr id="1" name=""/>
+        <p:cNvGrpSpPr/>
+        <p:nvPr/>
+      </p:nvGrpSpPr>
+      <p:grpSpPr>
+        <a:xfrm>
+          <a:off x="0" y="0"/>
+          <a:ext cx="0" cy="0"/>
+          <a:chOff x="0" y="0"/>
+          <a:chExt cx="0" cy="0"/>
+        </a:xfrm>
+      </p:grpSpPr>
+      <p:sp>
+        <p:nvSpPr>
+          <p:cNvPr id="476" name="TextShape 1"/>
+          <p:cNvSpPr txBox="1"/>
+          <p:nvPr/>
+        </p:nvSpPr>
+        <p:spPr>
+          <a:xfrm>
+            <a:off x="539640" y="-94680"/>
+            <a:ext cx="8136720" cy="1295640"/>
+          </a:xfrm>
+          <a:prstGeom prst="rect">
+            <a:avLst/>
+          </a:prstGeom>
+          <a:noFill/>
+          <a:ln>
+            <a:noFill/>
+          </a:ln>
+        </p:spPr>
+        <p:txBody>
+          <a:bodyPr anchor="ctr">
+            <a:normAutofit/>
+          </a:bodyPr>
+          <a:p>
+            <a:pPr algn="ctr">
+              <a:lnSpc>
+                <a:spcPct val="100000"/>
+              </a:lnSpc>
+            </a:pPr>
+            <a:r>
+              <a:rPr b="0" lang="tr-TR" sz="4000" spc="-1" strike="noStrike">
+                <a:solidFill>
+                  <a:srgbClr val="ffffff"/>
+                </a:solidFill>
+                <a:latin typeface="Ubuntu"/>
+              </a:rPr>
+              <a:t>EC2 Instance – User Data </a:t>
+            </a:r>
+            <a:endParaRPr b="0" lang="tr-TR" sz="4000" spc="-1" strike="noStrike">
+              <a:solidFill>
+                <a:srgbClr val="000000"/>
+              </a:solidFill>
+              <a:latin typeface="Calibri"/>
+            </a:endParaRPr>
+          </a:p>
+        </p:txBody>
+      </p:sp>
+      <p:sp>
+        <p:nvSpPr>
+          <p:cNvPr id="477" name="CustomShape 2"/>
           <p:cNvSpPr/>
           <p:nvPr/>
         </p:nvSpPr>
         <p:spPr>
           <a:xfrm>
-            <a:off x="4763880" y="4023360"/>
-            <a:ext cx="1053000" cy="110520"/>
+            <a:off x="179640" y="2137320"/>
+            <a:ext cx="2448000" cy="2861640"/>
           </a:xfrm>
           <a:prstGeom prst="rect">
             <a:avLst/>
@@ -19740,9 +20374,259 @@
           <a:fontRef idx="minor"/>
         </p:style>
       </p:sp>
+      <p:sp>
+        <p:nvSpPr>
+          <p:cNvPr id="478" name="CustomShape 3"/>
+          <p:cNvSpPr/>
+          <p:nvPr/>
+        </p:nvSpPr>
+        <p:spPr>
+          <a:xfrm>
+            <a:off x="548640" y="3193200"/>
+            <a:ext cx="1387080" cy="811440"/>
+          </a:xfrm>
+          <a:prstGeom prst="rect">
+            <a:avLst/>
+          </a:prstGeom>
+          <a:noFill/>
+          <a:ln>
+            <a:noFill/>
+          </a:ln>
+        </p:spPr>
+        <p:style>
+          <a:lnRef idx="0"/>
+          <a:fillRef idx="0"/>
+          <a:effectRef idx="0"/>
+          <a:fontRef idx="minor"/>
+        </p:style>
+        <p:txBody>
+          <a:bodyPr lIns="0" rIns="0" tIns="0" bIns="0"/>
+          <a:p>
+            <a:pPr>
+              <a:lnSpc>
+                <a:spcPct val="100000"/>
+              </a:lnSpc>
+            </a:pPr>
+            <a:r>
+              <a:rPr b="0" lang="en-US" sz="2400" spc="-1" strike="noStrike">
+                <a:solidFill>
+                  <a:srgbClr val="262626"/>
+                </a:solidFill>
+                <a:latin typeface="Ubuntu"/>
+                <a:ea typeface="Amazon Ember"/>
+              </a:rPr>
+              <a:t>   </a:t>
+            </a:r>
+            <a:r>
+              <a:rPr b="0" lang="en-US" sz="2400" spc="-1" strike="noStrike">
+                <a:solidFill>
+                  <a:srgbClr val="262626"/>
+                </a:solidFill>
+                <a:latin typeface="Ubuntu"/>
+                <a:ea typeface="Amazon Ember"/>
+              </a:rPr>
+              <a:t>Amazon</a:t>
+            </a:r>
+            <a:endParaRPr b="0" lang="en-US" sz="2400" spc="-1" strike="noStrike">
+              <a:latin typeface="Arial"/>
+            </a:endParaRPr>
+          </a:p>
+          <a:p>
+            <a:pPr>
+              <a:lnSpc>
+                <a:spcPct val="100000"/>
+              </a:lnSpc>
+            </a:pPr>
+            <a:r>
+              <a:rPr b="0" lang="en-US" sz="2400" spc="-1" strike="noStrike">
+                <a:solidFill>
+                  <a:srgbClr val="262626"/>
+                </a:solidFill>
+                <a:latin typeface="Ubuntu"/>
+                <a:ea typeface="Amazon Ember"/>
+              </a:rPr>
+              <a:t>       </a:t>
+            </a:r>
+            <a:r>
+              <a:rPr b="0" lang="en-US" sz="2400" spc="-1" strike="noStrike">
+                <a:solidFill>
+                  <a:srgbClr val="262626"/>
+                </a:solidFill>
+                <a:latin typeface="Ubuntu"/>
+                <a:ea typeface="Amazon Ember"/>
+              </a:rPr>
+              <a:t>EC2</a:t>
+            </a:r>
+            <a:endParaRPr b="0" lang="en-US" sz="2400" spc="-1" strike="noStrike">
+              <a:latin typeface="Arial"/>
+            </a:endParaRPr>
+          </a:p>
+        </p:txBody>
+      </p:sp>
+      <p:sp>
+        <p:nvSpPr>
+          <p:cNvPr id="479" name="CustomShape 4"/>
+          <p:cNvSpPr/>
+          <p:nvPr/>
+        </p:nvSpPr>
+        <p:spPr>
+          <a:xfrm>
+            <a:off x="274320" y="1463040"/>
+            <a:ext cx="1973160" cy="3273120"/>
+          </a:xfrm>
+          <a:prstGeom prst="rect">
+            <a:avLst/>
+          </a:prstGeom>
+          <a:noFill/>
+          <a:ln w="50760">
+            <a:solidFill>
+              <a:srgbClr val="ed7d31"/>
+            </a:solidFill>
+            <a:round/>
+          </a:ln>
+        </p:spPr>
+        <p:style>
+          <a:lnRef idx="0"/>
+          <a:fillRef idx="0"/>
+          <a:effectRef idx="0"/>
+          <a:fontRef idx="minor"/>
+        </p:style>
+      </p:sp>
+      <p:pic>
+        <p:nvPicPr>
+          <p:cNvPr id="480" name="Picture 17" descr=""/>
+          <p:cNvPicPr/>
+          <p:nvPr/>
+        </p:nvPicPr>
+        <p:blipFill>
+          <a:blip r:embed="rId1"/>
+          <a:stretch/>
+        </p:blipFill>
+        <p:spPr>
+          <a:xfrm>
+            <a:off x="890640" y="2137320"/>
+            <a:ext cx="791280" cy="949680"/>
+          </a:xfrm>
+          <a:prstGeom prst="rect">
+            <a:avLst/>
+          </a:prstGeom>
+          <a:ln>
+            <a:noFill/>
+          </a:ln>
+        </p:spPr>
+      </p:pic>
+      <p:sp>
+        <p:nvSpPr>
+          <p:cNvPr id="481" name="TextShape 5"/>
+          <p:cNvSpPr txBox="1"/>
+          <p:nvPr/>
+        </p:nvSpPr>
+        <p:spPr>
+          <a:xfrm>
+            <a:off x="2432880" y="1408680"/>
+            <a:ext cx="6492240" cy="2066040"/>
+          </a:xfrm>
+          <a:prstGeom prst="rect">
+            <a:avLst/>
+          </a:prstGeom>
+          <a:noFill/>
+          <a:ln>
+            <a:noFill/>
+          </a:ln>
+        </p:spPr>
+        <p:txBody>
+          <a:bodyPr lIns="90000" rIns="90000" tIns="45000" bIns="45000"/>
+          <a:p>
+            <a:pPr marL="216000" indent="-216000">
+              <a:spcAft>
+                <a:spcPts val="1009"/>
+              </a:spcAft>
+              <a:buClr>
+                <a:srgbClr val="000000"/>
+              </a:buClr>
+              <a:buSzPct val="45000"/>
+              <a:buFont typeface="Wingdings" charset="2"/>
+              <a:buChar char=""/>
+            </a:pPr>
+            <a:endParaRPr b="0" lang="en-US" sz="1800" spc="-1" strike="noStrike">
+              <a:latin typeface="Arial"/>
+            </a:endParaRPr>
+          </a:p>
+          <a:p>
+            <a:pPr marL="216000" indent="-216000">
+              <a:spcAft>
+                <a:spcPts val="1009"/>
+              </a:spcAft>
+              <a:buClr>
+                <a:srgbClr val="000000"/>
+              </a:buClr>
+              <a:buSzPct val="45000"/>
+              <a:buFont typeface="Wingdings" charset="2"/>
+              <a:buChar char=""/>
+            </a:pPr>
+            <a:r>
+              <a:rPr b="0" lang="en-US" sz="1500" spc="-1" strike="noStrike">
+                <a:latin typeface="Ubuntu"/>
+              </a:rPr>
+              <a:t>EC2 instancelar oluşturulurken yapılmak istenen extra ayarlamalar ve konfigurasyonlar User Data denilen text dosyaları ile sağlanmaktadır.</a:t>
+            </a:r>
+            <a:endParaRPr b="0" lang="en-US" sz="1500" spc="-1" strike="noStrike">
+              <a:latin typeface="Arial"/>
+            </a:endParaRPr>
+          </a:p>
+          <a:p>
+            <a:pPr marL="216000" indent="-216000">
+              <a:spcAft>
+                <a:spcPts val="1009"/>
+              </a:spcAft>
+              <a:buClr>
+                <a:srgbClr val="000000"/>
+              </a:buClr>
+              <a:buSzPct val="45000"/>
+              <a:buFont typeface="Wingdings" charset="2"/>
+              <a:buChar char=""/>
+            </a:pPr>
+            <a:r>
+              <a:rPr b="0" lang="en-US" sz="1500" spc="-1" strike="noStrike">
+                <a:latin typeface="Ubuntu"/>
+              </a:rPr>
+              <a:t>Örneğin EC2 instance oluşturulurken bir web sunucusu ayağa kaldırmak istiyorsak User Data kullanarak https servisini kurup aktif hale getirebiliriz.</a:t>
+            </a:r>
+            <a:endParaRPr b="0" lang="en-US" sz="1500" spc="-1" strike="noStrike">
+              <a:latin typeface="Arial"/>
+            </a:endParaRPr>
+          </a:p>
+        </p:txBody>
+      </p:sp>
+      <p:sp>
+        <p:nvSpPr>
+          <p:cNvPr id="482" name="CustomShape 6"/>
+          <p:cNvSpPr/>
+          <p:nvPr/>
+        </p:nvSpPr>
+        <p:spPr>
+          <a:xfrm>
+            <a:off x="4763880" y="4023360"/>
+            <a:ext cx="1053000" cy="110520"/>
+          </a:xfrm>
+          <a:prstGeom prst="rect">
+            <a:avLst/>
+          </a:prstGeom>
+          <a:noFill/>
+          <a:ln>
+            <a:noFill/>
+          </a:ln>
+        </p:spPr>
+        <p:style>
+          <a:lnRef idx="0"/>
+          <a:fillRef idx="0"/>
+          <a:effectRef idx="0"/>
+          <a:fontRef idx="minor"/>
+        </p:style>
+      </p:sp>
       <p:grpSp>
         <p:nvGrpSpPr>
-          <p:cNvPr id="477" name="Group 7"/>
+          <p:cNvPr id="483" name="Group 7"/>
           <p:cNvGrpSpPr/>
           <p:nvPr/>
         </p:nvGrpSpPr>
@@ -19756,7 +20640,7 @@
         </p:grpSpPr>
         <p:grpSp>
           <p:nvGrpSpPr>
-            <p:cNvPr id="478" name="Group 8"/>
+            <p:cNvPr id="484" name="Group 8"/>
             <p:cNvGrpSpPr/>
             <p:nvPr/>
           </p:nvGrpSpPr>
@@ -19770,7 +20654,7 @@
           </p:grpSpPr>
           <p:sp>
             <p:nvSpPr>
-              <p:cNvPr id="479" name="CustomShape 9"/>
+              <p:cNvPr id="485" name="CustomShape 9"/>
               <p:cNvSpPr/>
               <p:nvPr/>
             </p:nvSpPr>
@@ -19819,7 +20703,7 @@
           </p:sp>
           <p:grpSp>
             <p:nvGrpSpPr>
-              <p:cNvPr id="480" name="Group 10"/>
+              <p:cNvPr id="486" name="Group 10"/>
               <p:cNvGrpSpPr/>
               <p:nvPr/>
             </p:nvGrpSpPr>
@@ -19833,7 +20717,7 @@
             </p:grpSpPr>
             <p:pic>
               <p:nvPicPr>
-                <p:cNvPr id="481" name="Picture 15" descr=""/>
+                <p:cNvPr id="487" name="Picture 15" descr=""/>
                 <p:cNvPicPr/>
                 <p:nvPr/>
               </p:nvPicPr>
@@ -19856,7 +20740,7 @@
             </p:pic>
             <p:sp>
               <p:nvSpPr>
-                <p:cNvPr id="482" name="CustomShape 11"/>
+                <p:cNvPr id="488" name="CustomShape 11"/>
                 <p:cNvSpPr/>
                 <p:nvPr/>
               </p:nvSpPr>
@@ -19906,7 +20790,7 @@
           </p:grpSp>
           <p:sp>
             <p:nvSpPr>
-              <p:cNvPr id="483" name="CustomShape 12"/>
+              <p:cNvPr id="489" name="CustomShape 12"/>
               <p:cNvSpPr/>
               <p:nvPr/>
             </p:nvSpPr>
@@ -19940,7 +20824,7 @@
           </p:sp>
           <p:sp>
             <p:nvSpPr>
-              <p:cNvPr id="484" name="CustomShape 13"/>
+              <p:cNvPr id="490" name="CustomShape 13"/>
               <p:cNvSpPr/>
               <p:nvPr/>
             </p:nvSpPr>
@@ -19971,7 +20855,7 @@
           </p:sp>
           <p:sp>
             <p:nvSpPr>
-              <p:cNvPr id="485" name="CustomShape 14"/>
+              <p:cNvPr id="491" name="CustomShape 14"/>
               <p:cNvSpPr/>
               <p:nvPr/>
             </p:nvSpPr>
@@ -20080,7 +20964,7 @@
           </p:sp>
           <p:pic>
             <p:nvPicPr>
-              <p:cNvPr id="486" name="Picture 16" descr=""/>
+              <p:cNvPr id="492" name="Picture 16" descr=""/>
               <p:cNvPicPr/>
               <p:nvPr/>
             </p:nvPicPr>
@@ -20104,7 +20988,7 @@
         </p:grpSp>
         <p:sp>
           <p:nvSpPr>
-            <p:cNvPr id="487" name="TextShape 15"/>
+            <p:cNvPr id="493" name="TextShape 15"/>
             <p:cNvSpPr txBox="1"/>
             <p:nvPr/>
           </p:nvSpPr>
@@ -20141,763 +21025,6 @@
           </p:txBody>
         </p:sp>
       </p:grpSp>
-    </p:spTree>
-  </p:cSld>
-  <p:transition spd="slow">
-    <p:push dir="u"/>
-  </p:transition>
-  <p:timing>
-    <p:tnLst>
-      <p:par>
-        <p:cTn id="37" dur="indefinite" restart="never" nodeType="tmRoot">
-          <p:childTnLst>
-            <p:seq>
-              <p:cTn id="38" dur="indefinite" nodeType="mainSeq"/>
-              <p:prevCondLst>
-                <p:cond delay="0" evt="onPrev">
-                  <p:tgtEl>
-                    <p:sldTgt/>
-                  </p:tgtEl>
-                </p:cond>
-              </p:prevCondLst>
-              <p:nextCondLst>
-                <p:cond delay="0" evt="onNext">
-                  <p:tgtEl>
-                    <p:sldTgt/>
-                  </p:tgtEl>
-                </p:cond>
-              </p:nextCondLst>
-            </p:seq>
-          </p:childTnLst>
-        </p:cTn>
-      </p:par>
-    </p:tnLst>
-  </p:timing>
-</p:sld>
-</file>
-
-<file path=ppt/slides/slide2.xml><?xml version="1.0" encoding="utf-8"?>
-<p:sld xmlns:a="http://schemas.openxmlformats.org/drawingml/2006/main" xmlns:p="http://schemas.openxmlformats.org/presentationml/2006/main" xmlns:r="http://schemas.openxmlformats.org/officeDocument/2006/relationships" xmlns:p14="http://schemas.microsoft.com/office/powerpoint/2010/main" xmlns:p15="http://schemas.microsoft.com/office/powerpoint/2012/main" xmlns:mc="http://schemas.openxmlformats.org/markup-compatibility/2006">
-  <p:cSld>
-    <p:spTree>
-      <p:nvGrpSpPr>
-        <p:cNvPr id="1" name=""/>
-        <p:cNvGrpSpPr/>
-        <p:nvPr/>
-      </p:nvGrpSpPr>
-      <p:grpSpPr>
-        <a:xfrm>
-          <a:off x="0" y="0"/>
-          <a:ext cx="0" cy="0"/>
-          <a:chOff x="0" y="0"/>
-          <a:chExt cx="0" cy="0"/>
-        </a:xfrm>
-      </p:grpSpPr>
-      <p:sp>
-        <p:nvSpPr>
-          <p:cNvPr id="201" name="TextShape 1"/>
-          <p:cNvSpPr txBox="1"/>
-          <p:nvPr/>
-        </p:nvSpPr>
-        <p:spPr>
-          <a:xfrm>
-            <a:off x="467640" y="0"/>
-            <a:ext cx="8208720" cy="1200960"/>
-          </a:xfrm>
-          <a:prstGeom prst="rect">
-            <a:avLst/>
-          </a:prstGeom>
-          <a:noFill/>
-          <a:ln>
-            <a:noFill/>
-          </a:ln>
-        </p:spPr>
-        <p:txBody>
-          <a:bodyPr anchor="ctr">
-            <a:normAutofit/>
-          </a:bodyPr>
-          <a:p>
-            <a:r>
-              <a:rPr b="0" lang="tr-TR" sz="4000" spc="-1" strike="noStrike">
-                <a:solidFill>
-                  <a:srgbClr val="ffffff"/>
-                </a:solidFill>
-                <a:latin typeface="Ubuntu"/>
-              </a:rPr>
-              <a:t>Moderator Bilgileri</a:t>
-            </a:r>
-            <a:endParaRPr b="0" lang="tr-TR" sz="4000" spc="-1" strike="noStrike">
-              <a:solidFill>
-                <a:srgbClr val="000000"/>
-              </a:solidFill>
-              <a:latin typeface="Calibri"/>
-            </a:endParaRPr>
-          </a:p>
-        </p:txBody>
-      </p:sp>
-      <p:sp>
-        <p:nvSpPr>
-          <p:cNvPr id="202" name="TextShape 2"/>
-          <p:cNvSpPr txBox="1"/>
-          <p:nvPr/>
-        </p:nvSpPr>
-        <p:spPr>
-          <a:xfrm>
-            <a:off x="182880" y="1371600"/>
-            <a:ext cx="8722800" cy="3497760"/>
-          </a:xfrm>
-          <a:prstGeom prst="rect">
-            <a:avLst/>
-          </a:prstGeom>
-          <a:solidFill>
-            <a:srgbClr val="ffffff"/>
-          </a:solidFill>
-          <a:ln>
-            <a:solidFill>
-              <a:srgbClr val="3465a4"/>
-            </a:solidFill>
-          </a:ln>
-        </p:spPr>
-        <p:txBody>
-          <a:bodyPr lIns="90000" rIns="90000" tIns="45000" bIns="45000"/>
-          <a:p>
-            <a:r>
-              <a:rPr b="1" lang="en-US" sz="1600" spc="-1" strike="noStrike">
-                <a:latin typeface="Ubuntu"/>
-              </a:rPr>
-              <a:t>Serkan BİNGÖL – </a:t>
-            </a:r>
-            <a:r>
-              <a:rPr b="0" lang="en-US" sz="1600" spc="-1" strike="noStrike">
-                <a:latin typeface="Ubuntu"/>
-              </a:rPr>
-              <a:t>Technical Team Lead</a:t>
-            </a:r>
-            <a:endParaRPr b="0" lang="en-US" sz="1600" spc="-1" strike="noStrike">
-              <a:latin typeface="Arial"/>
-            </a:endParaRPr>
-          </a:p>
-          <a:p>
-            <a:r>
-              <a:rPr b="0" lang="en-US" sz="1600" spc="-1" strike="noStrike">
-                <a:latin typeface="Ubuntu"/>
-              </a:rPr>
-              <a:t>AWS Certified Solution Architect , MCSD, MCT</a:t>
-            </a:r>
-            <a:endParaRPr b="0" lang="en-US" sz="1600" spc="-1" strike="noStrike">
-              <a:latin typeface="Arial"/>
-            </a:endParaRPr>
-          </a:p>
-          <a:p>
-            <a:endParaRPr b="0" lang="en-US" sz="1600" spc="-1" strike="noStrike">
-              <a:latin typeface="Arial"/>
-            </a:endParaRPr>
-          </a:p>
-          <a:p>
-            <a:r>
-              <a:rPr b="0" lang="en-US" sz="1600" spc="-1" strike="noStrike">
-                <a:latin typeface="Ubuntu"/>
-              </a:rPr>
-              <a:t>Mail :         </a:t>
-            </a:r>
-            <a:r>
-              <a:rPr b="0" lang="en-US" sz="1600" spc="-1" strike="noStrike">
-                <a:latin typeface="Ubuntu"/>
-                <a:hlinkClick r:id="rId1"/>
-              </a:rPr>
-              <a:t>serkan.bingol@bilgeadam.com</a:t>
-            </a:r>
-            <a:endParaRPr b="0" lang="en-US" sz="1600" spc="-1" strike="noStrike">
-              <a:latin typeface="Arial"/>
-            </a:endParaRPr>
-          </a:p>
-          <a:p>
-            <a:r>
-              <a:rPr b="0" lang="en-US" sz="1600" spc="-1" strike="noStrike">
-                <a:latin typeface="Ubuntu"/>
-              </a:rPr>
-              <a:t>Linkedin : </a:t>
-            </a:r>
-            <a:r>
-              <a:rPr b="0" lang="en-US" sz="1600" spc="-1" strike="noStrike">
-                <a:latin typeface="Ubuntu"/>
-                <a:hlinkClick r:id="rId2"/>
-              </a:rPr>
-              <a:t>https://www.linkedin.com/in/sbingol/</a:t>
-            </a:r>
-            <a:endParaRPr b="0" lang="en-US" sz="1600" spc="-1" strike="noStrike">
-              <a:latin typeface="Arial"/>
-            </a:endParaRPr>
-          </a:p>
-          <a:p>
-            <a:r>
-              <a:rPr b="0" lang="en-US" sz="1600" spc="-1" strike="noStrike">
-                <a:latin typeface="Ubuntu"/>
-              </a:rPr>
-              <a:t>Github :    </a:t>
-            </a:r>
-            <a:r>
-              <a:rPr b="0" lang="en-US" sz="1600" spc="-1" strike="noStrike">
-                <a:latin typeface="Ubuntu"/>
-                <a:hlinkClick r:id="rId3"/>
-              </a:rPr>
-              <a:t>https://github.com/serkanbingol</a:t>
-            </a:r>
-            <a:endParaRPr b="0" lang="en-US" sz="1600" spc="-1" strike="noStrike">
-              <a:latin typeface="Arial"/>
-            </a:endParaRPr>
-          </a:p>
-          <a:p>
-            <a:r>
-              <a:rPr b="0" lang="en-US" sz="1600" spc="-1" strike="noStrike">
-                <a:latin typeface="Ubuntu"/>
-              </a:rPr>
-              <a:t>Medium : </a:t>
-            </a:r>
-            <a:r>
-              <a:rPr b="0" lang="en-US" sz="1600" spc="-1" strike="noStrike">
-                <a:latin typeface="Ubuntu"/>
-                <a:hlinkClick r:id="rId4"/>
-              </a:rPr>
-              <a:t>https://medium.com/@serkanbingoll</a:t>
-            </a:r>
-            <a:endParaRPr b="0" lang="en-US" sz="1600" spc="-1" strike="noStrike">
-              <a:latin typeface="Arial"/>
-            </a:endParaRPr>
-          </a:p>
-          <a:p>
-            <a:endParaRPr b="0" lang="en-US" sz="1600" spc="-1" strike="noStrike">
-              <a:latin typeface="Arial"/>
-            </a:endParaRPr>
-          </a:p>
-          <a:p>
-            <a:r>
-              <a:rPr b="1" lang="en-US" sz="1600" spc="-1" strike="noStrike">
-                <a:latin typeface="Ubuntu"/>
-              </a:rPr>
-              <a:t>Bilgeadam Hesapları</a:t>
-            </a:r>
-            <a:endParaRPr b="0" lang="en-US" sz="1600" spc="-1" strike="noStrike">
-              <a:latin typeface="Arial"/>
-            </a:endParaRPr>
-          </a:p>
-          <a:p>
-            <a:endParaRPr b="0" lang="en-US" sz="1600" spc="-1" strike="noStrike">
-              <a:latin typeface="Arial"/>
-            </a:endParaRPr>
-          </a:p>
-          <a:p>
-            <a:r>
-              <a:rPr b="0" lang="en-US" sz="1600" spc="-1" strike="noStrike">
-                <a:latin typeface="Ubuntu"/>
-              </a:rPr>
-              <a:t>Web :        </a:t>
-            </a:r>
-            <a:r>
-              <a:rPr b="0" lang="en-US" sz="1600" spc="-1" strike="noStrike">
-                <a:latin typeface="Ubuntu"/>
-                <a:hlinkClick r:id="rId5"/>
-              </a:rPr>
-              <a:t>https://www.bilgeadam.com/</a:t>
-            </a:r>
-            <a:r>
-              <a:rPr b="0" lang="en-US" sz="1600" spc="-1" strike="noStrike">
-                <a:latin typeface="Ubuntu"/>
-              </a:rPr>
-              <a:t>   </a:t>
-            </a:r>
-            <a:endParaRPr b="0" lang="en-US" sz="1600" spc="-1" strike="noStrike">
-              <a:latin typeface="Arial"/>
-            </a:endParaRPr>
-          </a:p>
-          <a:p>
-            <a:r>
-              <a:rPr b="0" lang="en-US" sz="1600" spc="-1" strike="noStrike">
-                <a:latin typeface="Ubuntu"/>
-              </a:rPr>
-              <a:t>Linkedin : </a:t>
-            </a:r>
-            <a:r>
-              <a:rPr b="0" lang="en-US" sz="1600" spc="-1" strike="noStrike">
-                <a:latin typeface="Ubuntu"/>
-                <a:hlinkClick r:id="rId6"/>
-              </a:rPr>
-              <a:t>https://www.linkedin.com/company/bilge-adam/</a:t>
-            </a:r>
-            <a:endParaRPr b="0" lang="en-US" sz="1600" spc="-1" strike="noStrike">
-              <a:latin typeface="Arial"/>
-            </a:endParaRPr>
-          </a:p>
-          <a:p>
-            <a:r>
-              <a:rPr b="0" lang="en-US" sz="1600" spc="-1" strike="noStrike">
-                <a:latin typeface="Ubuntu"/>
-              </a:rPr>
-              <a:t>Twitter :   </a:t>
-            </a:r>
-            <a:r>
-              <a:rPr b="0" lang="en-US" sz="1600" spc="-1" strike="noStrike">
-                <a:latin typeface="Ubuntu"/>
-                <a:hlinkClick r:id="rId7"/>
-              </a:rPr>
-              <a:t>https://twitter.com/bilgeadam</a:t>
-            </a:r>
-            <a:endParaRPr b="0" lang="en-US" sz="1600" spc="-1" strike="noStrike">
-              <a:latin typeface="Arial"/>
-            </a:endParaRPr>
-          </a:p>
-          <a:p>
-            <a:r>
-              <a:rPr b="0" lang="en-US" sz="1600" spc="-1" strike="noStrike">
-                <a:latin typeface="Ubuntu"/>
-                <a:ea typeface="Noto Sans CJK SC"/>
-              </a:rPr>
-              <a:t>Medium : </a:t>
-            </a:r>
-            <a:r>
-              <a:rPr b="0" lang="en-US" sz="1600" spc="-1" strike="noStrike">
-                <a:latin typeface="Ubuntu"/>
-                <a:hlinkClick r:id="rId8"/>
-              </a:rPr>
-              <a:t>https://medium.com/batech</a:t>
-            </a:r>
-            <a:endParaRPr b="0" lang="en-US" sz="1600" spc="-1" strike="noStrike">
-              <a:latin typeface="Arial"/>
-            </a:endParaRPr>
-          </a:p>
-          <a:p>
-            <a:endParaRPr b="0" lang="en-US" sz="1600" spc="-1" strike="noStrike">
-              <a:latin typeface="Arial"/>
-            </a:endParaRPr>
-          </a:p>
-        </p:txBody>
-      </p:sp>
-    </p:spTree>
-  </p:cSld>
-  <p:transition spd="slow">
-    <p:push dir="u"/>
-  </p:transition>
-  <p:timing>
-    <p:tnLst>
-      <p:par>
-        <p:cTn id="3" dur="indefinite" restart="never" nodeType="tmRoot">
-          <p:childTnLst>
-            <p:seq>
-              <p:cTn id="4" dur="indefinite" nodeType="mainSeq"/>
-              <p:prevCondLst>
-                <p:cond delay="0" evt="onPrev">
-                  <p:tgtEl>
-                    <p:sldTgt/>
-                  </p:tgtEl>
-                </p:cond>
-              </p:prevCondLst>
-              <p:nextCondLst>
-                <p:cond delay="0" evt="onNext">
-                  <p:tgtEl>
-                    <p:sldTgt/>
-                  </p:tgtEl>
-                </p:cond>
-              </p:nextCondLst>
-            </p:seq>
-          </p:childTnLst>
-        </p:cTn>
-      </p:par>
-    </p:tnLst>
-  </p:timing>
-</p:sld>
-</file>
-
-<file path=ppt/slides/slide20.xml><?xml version="1.0" encoding="utf-8"?>
-<p:sld xmlns:a="http://schemas.openxmlformats.org/drawingml/2006/main" xmlns:p="http://schemas.openxmlformats.org/presentationml/2006/main" xmlns:r="http://schemas.openxmlformats.org/officeDocument/2006/relationships" xmlns:p14="http://schemas.microsoft.com/office/powerpoint/2010/main" xmlns:p15="http://schemas.microsoft.com/office/powerpoint/2012/main" xmlns:mc="http://schemas.openxmlformats.org/markup-compatibility/2006">
-  <p:cSld>
-    <p:spTree>
-      <p:nvGrpSpPr>
-        <p:cNvPr id="1" name=""/>
-        <p:cNvGrpSpPr/>
-        <p:nvPr/>
-      </p:nvGrpSpPr>
-      <p:grpSpPr>
-        <a:xfrm>
-          <a:off x="0" y="0"/>
-          <a:ext cx="0" cy="0"/>
-          <a:chOff x="0" y="0"/>
-          <a:chExt cx="0" cy="0"/>
-        </a:xfrm>
-      </p:grpSpPr>
-      <p:sp>
-        <p:nvSpPr>
-          <p:cNvPr id="488" name="TextShape 1"/>
-          <p:cNvSpPr txBox="1"/>
-          <p:nvPr/>
-        </p:nvSpPr>
-        <p:spPr>
-          <a:xfrm>
-            <a:off x="539640" y="-94680"/>
-            <a:ext cx="8136720" cy="1295640"/>
-          </a:xfrm>
-          <a:prstGeom prst="rect">
-            <a:avLst/>
-          </a:prstGeom>
-          <a:noFill/>
-          <a:ln>
-            <a:noFill/>
-          </a:ln>
-        </p:spPr>
-        <p:txBody>
-          <a:bodyPr anchor="ctr">
-            <a:normAutofit/>
-          </a:bodyPr>
-          <a:p>
-            <a:pPr algn="ctr">
-              <a:lnSpc>
-                <a:spcPct val="100000"/>
-              </a:lnSpc>
-            </a:pPr>
-            <a:r>
-              <a:rPr b="0" lang="tr-TR" sz="4000" spc="-1" strike="noStrike">
-                <a:solidFill>
-                  <a:srgbClr val="ffffff"/>
-                </a:solidFill>
-                <a:latin typeface="Ubuntu"/>
-              </a:rPr>
-              <a:t>RDS – İlişkisel Veritabanları</a:t>
-            </a:r>
-            <a:endParaRPr b="0" lang="tr-TR" sz="4000" spc="-1" strike="noStrike">
-              <a:solidFill>
-                <a:srgbClr val="000000"/>
-              </a:solidFill>
-              <a:latin typeface="Calibri"/>
-            </a:endParaRPr>
-          </a:p>
-        </p:txBody>
-      </p:sp>
-      <p:sp>
-        <p:nvSpPr>
-          <p:cNvPr id="489" name="CustomShape 2"/>
-          <p:cNvSpPr/>
-          <p:nvPr/>
-        </p:nvSpPr>
-        <p:spPr>
-          <a:xfrm>
-            <a:off x="179640" y="2137320"/>
-            <a:ext cx="2448000" cy="2861640"/>
-          </a:xfrm>
-          <a:prstGeom prst="rect">
-            <a:avLst/>
-          </a:prstGeom>
-          <a:noFill/>
-          <a:ln>
-            <a:noFill/>
-          </a:ln>
-        </p:spPr>
-        <p:style>
-          <a:lnRef idx="0"/>
-          <a:fillRef idx="0"/>
-          <a:effectRef idx="0"/>
-          <a:fontRef idx="minor"/>
-        </p:style>
-      </p:sp>
-      <p:pic>
-        <p:nvPicPr>
-          <p:cNvPr id="490" name="Picture 24" descr=""/>
-          <p:cNvPicPr/>
-          <p:nvPr/>
-        </p:nvPicPr>
-        <p:blipFill>
-          <a:blip r:embed="rId1"/>
-          <a:stretch/>
-        </p:blipFill>
-        <p:spPr>
-          <a:xfrm>
-            <a:off x="939240" y="2468880"/>
-            <a:ext cx="706680" cy="817560"/>
-          </a:xfrm>
-          <a:prstGeom prst="rect">
-            <a:avLst/>
-          </a:prstGeom>
-          <a:ln>
-            <a:noFill/>
-          </a:ln>
-        </p:spPr>
-      </p:pic>
-      <p:sp>
-        <p:nvSpPr>
-          <p:cNvPr id="491" name="CustomShape 3"/>
-          <p:cNvSpPr/>
-          <p:nvPr/>
-        </p:nvSpPr>
-        <p:spPr>
-          <a:xfrm>
-            <a:off x="640080" y="3475800"/>
-            <a:ext cx="1247040" cy="606600"/>
-          </a:xfrm>
-          <a:prstGeom prst="rect">
-            <a:avLst/>
-          </a:prstGeom>
-          <a:noFill/>
-          <a:ln>
-            <a:noFill/>
-          </a:ln>
-        </p:spPr>
-        <p:style>
-          <a:lnRef idx="0"/>
-          <a:fillRef idx="0"/>
-          <a:effectRef idx="0"/>
-          <a:fontRef idx="minor"/>
-        </p:style>
-        <p:txBody>
-          <a:bodyPr lIns="90000" rIns="90000" tIns="45000" bIns="45000"/>
-          <a:p>
-            <a:pPr algn="ctr">
-              <a:lnSpc>
-                <a:spcPct val="100000"/>
-              </a:lnSpc>
-            </a:pPr>
-            <a:r>
-              <a:rPr b="0" lang="en-US" sz="2000" spc="-1" strike="noStrike">
-                <a:solidFill>
-                  <a:srgbClr val="000000"/>
-                </a:solidFill>
-                <a:latin typeface="Ubuntu"/>
-                <a:ea typeface="Amazon Ember"/>
-              </a:rPr>
-              <a:t>Amazon RDS</a:t>
-            </a:r>
-            <a:endParaRPr b="0" lang="en-US" sz="2000" spc="-1" strike="noStrike">
-              <a:latin typeface="Arial"/>
-            </a:endParaRPr>
-          </a:p>
-        </p:txBody>
-      </p:sp>
-      <p:sp>
-        <p:nvSpPr>
-          <p:cNvPr id="492" name="CustomShape 4"/>
-          <p:cNvSpPr/>
-          <p:nvPr/>
-        </p:nvSpPr>
-        <p:spPr>
-          <a:xfrm>
-            <a:off x="599400" y="1920240"/>
-            <a:ext cx="1412280" cy="271440"/>
-          </a:xfrm>
-          <a:prstGeom prst="rect">
-            <a:avLst/>
-          </a:prstGeom>
-          <a:noFill/>
-          <a:ln>
-            <a:noFill/>
-          </a:ln>
-        </p:spPr>
-        <p:style>
-          <a:lnRef idx="0"/>
-          <a:fillRef idx="0"/>
-          <a:effectRef idx="0"/>
-          <a:fontRef idx="minor"/>
-        </p:style>
-        <p:txBody>
-          <a:bodyPr lIns="90000" rIns="90000" tIns="45000" bIns="45000"/>
-          <a:p>
-            <a:pPr algn="ctr">
-              <a:lnSpc>
-                <a:spcPct val="100000"/>
-              </a:lnSpc>
-            </a:pPr>
-            <a:r>
-              <a:rPr b="0" lang="en-US" sz="2000" spc="-1" strike="noStrike">
-                <a:solidFill>
-                  <a:srgbClr val="000000"/>
-                </a:solidFill>
-                <a:latin typeface="Ubuntu"/>
-                <a:ea typeface="Amazon Ember"/>
-              </a:rPr>
-              <a:t>Relational</a:t>
-            </a:r>
-            <a:endParaRPr b="0" lang="en-US" sz="2000" spc="-1" strike="noStrike">
-              <a:latin typeface="Arial"/>
-            </a:endParaRPr>
-          </a:p>
-        </p:txBody>
-      </p:sp>
-      <p:sp>
-        <p:nvSpPr>
-          <p:cNvPr id="493" name="CustomShape 5"/>
-          <p:cNvSpPr/>
-          <p:nvPr/>
-        </p:nvSpPr>
-        <p:spPr>
-          <a:xfrm>
-            <a:off x="274320" y="1463040"/>
-            <a:ext cx="1973160" cy="3273120"/>
-          </a:xfrm>
-          <a:prstGeom prst="rect">
-            <a:avLst/>
-          </a:prstGeom>
-          <a:noFill/>
-          <a:ln w="50760">
-            <a:solidFill>
-              <a:srgbClr val="ed7d31"/>
-            </a:solidFill>
-            <a:round/>
-          </a:ln>
-        </p:spPr>
-        <p:style>
-          <a:lnRef idx="0"/>
-          <a:fillRef idx="0"/>
-          <a:effectRef idx="0"/>
-          <a:fontRef idx="minor"/>
-        </p:style>
-      </p:sp>
-      <p:sp>
-        <p:nvSpPr>
-          <p:cNvPr id="494" name="TextShape 6"/>
-          <p:cNvSpPr txBox="1"/>
-          <p:nvPr/>
-        </p:nvSpPr>
-        <p:spPr>
-          <a:xfrm>
-            <a:off x="2468880" y="1483920"/>
-            <a:ext cx="6492240" cy="2767320"/>
-          </a:xfrm>
-          <a:prstGeom prst="rect">
-            <a:avLst/>
-          </a:prstGeom>
-          <a:noFill/>
-          <a:ln>
-            <a:noFill/>
-          </a:ln>
-        </p:spPr>
-        <p:txBody>
-          <a:bodyPr lIns="90000" rIns="90000" tIns="45000" bIns="45000"/>
-          <a:p>
-            <a:pPr marL="216000" indent="-216000">
-              <a:buClr>
-                <a:srgbClr val="000000"/>
-              </a:buClr>
-              <a:buSzPct val="45000"/>
-              <a:buFont typeface="Wingdings" charset="2"/>
-              <a:buChar char=""/>
-            </a:pPr>
-            <a:r>
-              <a:rPr b="0" lang="en-US" sz="1600" spc="-1" strike="noStrike">
-                <a:latin typeface="Ubuntu"/>
-              </a:rPr>
-              <a:t>AWS içinde ilişkisel veritabanı kurmayı, çalıştırmayı ve ölçeklendirmeyi kolaylaştıran bir yönetilen hizmettir.</a:t>
-            </a:r>
-            <a:endParaRPr b="0" lang="en-US" sz="1600" spc="-1" strike="noStrike">
-              <a:latin typeface="Arial"/>
-            </a:endParaRPr>
-          </a:p>
-          <a:p>
-            <a:pPr marL="216000" indent="-216000">
-              <a:buClr>
-                <a:srgbClr val="000000"/>
-              </a:buClr>
-              <a:buSzPct val="45000"/>
-              <a:buFont typeface="Wingdings" charset="2"/>
-              <a:buChar char=""/>
-            </a:pPr>
-            <a:endParaRPr b="0" lang="en-US" sz="1600" spc="-1" strike="noStrike">
-              <a:latin typeface="Arial"/>
-            </a:endParaRPr>
-          </a:p>
-          <a:p>
-            <a:pPr marL="216000" indent="-216000">
-              <a:buClr>
-                <a:srgbClr val="000000"/>
-              </a:buClr>
-              <a:buSzPct val="45000"/>
-              <a:buFont typeface="Wingdings" charset="2"/>
-              <a:buChar char=""/>
-            </a:pPr>
-            <a:r>
-              <a:rPr b="0" lang="en-US" sz="1500" spc="-1" strike="noStrike">
-                <a:latin typeface="Ubuntu"/>
-              </a:rPr>
-              <a:t>Dakikalar içinde yeni veritabanı sunucuları ayaklandırabiliriz. </a:t>
-            </a:r>
-            <a:endParaRPr b="0" lang="en-US" sz="1500" spc="-1" strike="noStrike">
-              <a:latin typeface="Arial"/>
-            </a:endParaRPr>
-          </a:p>
-          <a:p>
-            <a:pPr marL="216000" indent="-216000">
-              <a:buClr>
-                <a:srgbClr val="000000"/>
-              </a:buClr>
-              <a:buSzPct val="45000"/>
-              <a:buFont typeface="Wingdings" charset="2"/>
-              <a:buChar char=""/>
-            </a:pPr>
-            <a:endParaRPr b="0" lang="en-US" sz="1500" spc="-1" strike="noStrike">
-              <a:latin typeface="Arial"/>
-            </a:endParaRPr>
-          </a:p>
-          <a:p>
-            <a:pPr marL="216000" indent="-216000">
-              <a:buClr>
-                <a:srgbClr val="000000"/>
-              </a:buClr>
-              <a:buSzPct val="45000"/>
-              <a:buFont typeface="Wingdings" charset="2"/>
-              <a:buChar char=""/>
-            </a:pPr>
-            <a:r>
-              <a:rPr b="0" lang="en-US" sz="1600" spc="-1" strike="noStrike">
-                <a:latin typeface="Ubuntu"/>
-              </a:rPr>
-              <a:t>Fully managed bir servistir. Yeniden boyutlandırılabilen kapasite sağlamasının yanı sıra zaman alan veritabanı yönetim görevlerini yönetir.</a:t>
-            </a:r>
-            <a:endParaRPr b="0" lang="en-US" sz="1600" spc="-1" strike="noStrike">
-              <a:latin typeface="Arial"/>
-            </a:endParaRPr>
-          </a:p>
-          <a:p>
-            <a:pPr marL="216000" indent="-216000">
-              <a:buClr>
-                <a:srgbClr val="000000"/>
-              </a:buClr>
-              <a:buSzPct val="45000"/>
-              <a:buFont typeface="Wingdings" charset="2"/>
-              <a:buChar char=""/>
-            </a:pPr>
-            <a:endParaRPr b="0" lang="en-US" sz="1600" spc="-1" strike="noStrike">
-              <a:latin typeface="Arial"/>
-            </a:endParaRPr>
-          </a:p>
-          <a:p>
-            <a:pPr marL="216000" indent="-216000">
-              <a:buClr>
-                <a:srgbClr val="000000"/>
-              </a:buClr>
-              <a:buSzPct val="45000"/>
-              <a:buFont typeface="Wingdings" charset="2"/>
-              <a:buChar char=""/>
-            </a:pPr>
-            <a:r>
-              <a:rPr b="0" lang="en-US" sz="1600" spc="-1" strike="noStrike">
-                <a:latin typeface="Ubuntu"/>
-              </a:rPr>
-              <a:t>MySQL, MariaDB, Oracle, SQL Server veya PostgreSQL veritabanlarını destekler.</a:t>
-            </a:r>
-            <a:endParaRPr b="0" lang="en-US" sz="1600" spc="-1" strike="noStrike">
-              <a:latin typeface="Arial"/>
-            </a:endParaRPr>
-          </a:p>
-          <a:p>
-            <a:pPr marL="216000" indent="-216000">
-              <a:buClr>
-                <a:srgbClr val="000000"/>
-              </a:buClr>
-              <a:buSzPct val="45000"/>
-              <a:buFont typeface="Wingdings" charset="2"/>
-              <a:buChar char=""/>
-            </a:pPr>
-            <a:endParaRPr b="0" lang="en-US" sz="1600" spc="-1" strike="noStrike">
-              <a:latin typeface="Arial"/>
-            </a:endParaRPr>
-          </a:p>
-        </p:txBody>
-      </p:sp>
     </p:spTree>
   </p:cSld>
   <p:transition spd="slow">
@@ -20952,7 +21079,7 @@
       </p:grpSpPr>
       <p:sp>
         <p:nvSpPr>
-          <p:cNvPr id="495" name="TextShape 1"/>
+          <p:cNvPr id="494" name="TextShape 1"/>
           <p:cNvSpPr txBox="1"/>
           <p:nvPr/>
         </p:nvSpPr>
@@ -20986,7 +21113,7 @@
                 </a:solidFill>
                 <a:latin typeface="Ubuntu"/>
               </a:rPr>
-              <a:t>DEMO</a:t>
+              <a:t>EC2 Instance – Key Pairs</a:t>
             </a:r>
             <a:endParaRPr b="0" lang="tr-TR" sz="4000" spc="-1" strike="noStrike">
               <a:solidFill>
@@ -20999,7 +21126,7 @@
       </p:sp>
       <p:sp>
         <p:nvSpPr>
-          <p:cNvPr id="496" name="CustomShape 2"/>
+          <p:cNvPr id="495" name="CustomShape 2"/>
           <p:cNvSpPr/>
           <p:nvPr/>
         </p:nvSpPr>
@@ -21023,9 +21150,794 @@
           <a:fontRef idx="minor"/>
         </p:style>
       </p:sp>
+      <p:sp>
+        <p:nvSpPr>
+          <p:cNvPr id="496" name="CustomShape 3"/>
+          <p:cNvSpPr/>
+          <p:nvPr/>
+        </p:nvSpPr>
+        <p:spPr>
+          <a:xfrm>
+            <a:off x="548640" y="3193200"/>
+            <a:ext cx="1387080" cy="811440"/>
+          </a:xfrm>
+          <a:prstGeom prst="rect">
+            <a:avLst/>
+          </a:prstGeom>
+          <a:noFill/>
+          <a:ln>
+            <a:noFill/>
+          </a:ln>
+        </p:spPr>
+        <p:style>
+          <a:lnRef idx="0"/>
+          <a:fillRef idx="0"/>
+          <a:effectRef idx="0"/>
+          <a:fontRef idx="minor"/>
+        </p:style>
+        <p:txBody>
+          <a:bodyPr lIns="0" rIns="0" tIns="0" bIns="0"/>
+          <a:p>
+            <a:pPr>
+              <a:lnSpc>
+                <a:spcPct val="100000"/>
+              </a:lnSpc>
+            </a:pPr>
+            <a:r>
+              <a:rPr b="0" lang="en-US" sz="2400" spc="-1" strike="noStrike">
+                <a:solidFill>
+                  <a:srgbClr val="262626"/>
+                </a:solidFill>
+                <a:latin typeface="Ubuntu"/>
+                <a:ea typeface="Amazon Ember"/>
+              </a:rPr>
+              <a:t>   </a:t>
+            </a:r>
+            <a:r>
+              <a:rPr b="0" lang="en-US" sz="2400" spc="-1" strike="noStrike">
+                <a:solidFill>
+                  <a:srgbClr val="262626"/>
+                </a:solidFill>
+                <a:latin typeface="Ubuntu"/>
+                <a:ea typeface="Amazon Ember"/>
+              </a:rPr>
+              <a:t>Amazon</a:t>
+            </a:r>
+            <a:endParaRPr b="0" lang="en-US" sz="2400" spc="-1" strike="noStrike">
+              <a:latin typeface="Arial"/>
+            </a:endParaRPr>
+          </a:p>
+          <a:p>
+            <a:pPr>
+              <a:lnSpc>
+                <a:spcPct val="100000"/>
+              </a:lnSpc>
+            </a:pPr>
+            <a:r>
+              <a:rPr b="0" lang="en-US" sz="2400" spc="-1" strike="noStrike">
+                <a:solidFill>
+                  <a:srgbClr val="262626"/>
+                </a:solidFill>
+                <a:latin typeface="Ubuntu"/>
+                <a:ea typeface="Amazon Ember"/>
+              </a:rPr>
+              <a:t>       </a:t>
+            </a:r>
+            <a:r>
+              <a:rPr b="0" lang="en-US" sz="2400" spc="-1" strike="noStrike">
+                <a:solidFill>
+                  <a:srgbClr val="262626"/>
+                </a:solidFill>
+                <a:latin typeface="Ubuntu"/>
+                <a:ea typeface="Amazon Ember"/>
+              </a:rPr>
+              <a:t>EC2</a:t>
+            </a:r>
+            <a:endParaRPr b="0" lang="en-US" sz="2400" spc="-1" strike="noStrike">
+              <a:latin typeface="Arial"/>
+            </a:endParaRPr>
+          </a:p>
+        </p:txBody>
+      </p:sp>
+      <p:sp>
+        <p:nvSpPr>
+          <p:cNvPr id="497" name="CustomShape 4"/>
+          <p:cNvSpPr/>
+          <p:nvPr/>
+        </p:nvSpPr>
+        <p:spPr>
+          <a:xfrm>
+            <a:off x="274320" y="1463040"/>
+            <a:ext cx="1973160" cy="3273120"/>
+          </a:xfrm>
+          <a:prstGeom prst="rect">
+            <a:avLst/>
+          </a:prstGeom>
+          <a:noFill/>
+          <a:ln w="50760">
+            <a:solidFill>
+              <a:srgbClr val="ed7d31"/>
+            </a:solidFill>
+            <a:round/>
+          </a:ln>
+        </p:spPr>
+        <p:style>
+          <a:lnRef idx="0"/>
+          <a:fillRef idx="0"/>
+          <a:effectRef idx="0"/>
+          <a:fontRef idx="minor"/>
+        </p:style>
+      </p:sp>
+      <p:pic>
+        <p:nvPicPr>
+          <p:cNvPr id="498" name="Picture 17" descr=""/>
+          <p:cNvPicPr/>
+          <p:nvPr/>
+        </p:nvPicPr>
+        <p:blipFill>
+          <a:blip r:embed="rId1"/>
+          <a:stretch/>
+        </p:blipFill>
+        <p:spPr>
+          <a:xfrm>
+            <a:off x="890640" y="2137320"/>
+            <a:ext cx="791280" cy="949680"/>
+          </a:xfrm>
+          <a:prstGeom prst="rect">
+            <a:avLst/>
+          </a:prstGeom>
+          <a:ln>
+            <a:noFill/>
+          </a:ln>
+        </p:spPr>
+      </p:pic>
+      <p:sp>
+        <p:nvSpPr>
+          <p:cNvPr id="499" name="TextShape 5"/>
+          <p:cNvSpPr txBox="1"/>
+          <p:nvPr/>
+        </p:nvSpPr>
+        <p:spPr>
+          <a:xfrm>
+            <a:off x="2432880" y="2011680"/>
+            <a:ext cx="6492240" cy="2066040"/>
+          </a:xfrm>
+          <a:prstGeom prst="rect">
+            <a:avLst/>
+          </a:prstGeom>
+          <a:noFill/>
+          <a:ln>
+            <a:noFill/>
+          </a:ln>
+        </p:spPr>
+        <p:txBody>
+          <a:bodyPr lIns="90000" rIns="90000" tIns="45000" bIns="45000"/>
+          <a:p>
+            <a:pPr marL="216000" indent="-216000">
+              <a:spcAft>
+                <a:spcPts val="1009"/>
+              </a:spcAft>
+              <a:buClr>
+                <a:srgbClr val="000000"/>
+              </a:buClr>
+              <a:buSzPct val="45000"/>
+              <a:buFont typeface="Wingdings" charset="2"/>
+              <a:buChar char=""/>
+            </a:pPr>
+            <a:r>
+              <a:rPr b="0" lang="en-US" sz="1500" spc="-1" strike="noStrike">
+                <a:latin typeface="Ubuntu"/>
+              </a:rPr>
+              <a:t>AWS üzerinde linux bulut sunucumuza SSH ile güvenli erişim için bir anahtar çifti kullanmaktayız. Bir kapı kilidinde olduğu gibi, anahtar çiftinin herkese açık olan bölümü AWS'de saklanır. Bu kilidi açacak anahtarı, yani anahtar çiftinin özel olan bölümünü indirip kullanırız.</a:t>
+            </a:r>
+            <a:endParaRPr b="0" lang="en-US" sz="1500" spc="-1" strike="noStrike">
+              <a:latin typeface="Arial"/>
+            </a:endParaRPr>
+          </a:p>
+          <a:p>
+            <a:pPr marL="216000" indent="-216000">
+              <a:spcAft>
+                <a:spcPts val="1009"/>
+              </a:spcAft>
+              <a:buClr>
+                <a:srgbClr val="000000"/>
+              </a:buClr>
+              <a:buSzPct val="45000"/>
+              <a:buFont typeface="Wingdings" charset="2"/>
+              <a:buChar char=""/>
+            </a:pPr>
+            <a:r>
+              <a:rPr b="0" lang="en-US" sz="1500" spc="-1" strike="noStrike">
+                <a:latin typeface="Ubuntu"/>
+              </a:rPr>
+              <a:t>Oluşturulan anahtarı indirdikten sonra anahtarınızı güvenli bir yerde saklamamız gerekir. Anahtarınızı kaybedersek bulut sunucumuza erişemeyiz. Bu anahtara sahip kişile oluşturduğumuz bulut sunucularına erişebilmektedir.</a:t>
+            </a:r>
+            <a:endParaRPr b="0" lang="en-US" sz="1500" spc="-1" strike="noStrike">
+              <a:latin typeface="Arial"/>
+            </a:endParaRPr>
+          </a:p>
+        </p:txBody>
+      </p:sp>
+      <p:sp>
+        <p:nvSpPr>
+          <p:cNvPr id="500" name="CustomShape 6"/>
+          <p:cNvSpPr/>
+          <p:nvPr/>
+        </p:nvSpPr>
+        <p:spPr>
+          <a:xfrm>
+            <a:off x="4763880" y="4023360"/>
+            <a:ext cx="1053000" cy="110520"/>
+          </a:xfrm>
+          <a:prstGeom prst="rect">
+            <a:avLst/>
+          </a:prstGeom>
+          <a:noFill/>
+          <a:ln>
+            <a:noFill/>
+          </a:ln>
+        </p:spPr>
+        <p:style>
+          <a:lnRef idx="0"/>
+          <a:fillRef idx="0"/>
+          <a:effectRef idx="0"/>
+          <a:fontRef idx="minor"/>
+        </p:style>
+      </p:sp>
+    </p:spTree>
+  </p:cSld>
+  <p:transition spd="slow">
+    <p:push dir="u"/>
+  </p:transition>
+  <p:timing>
+    <p:tnLst>
+      <p:par>
+        <p:cTn id="41" dur="indefinite" restart="never" nodeType="tmRoot">
+          <p:childTnLst>
+            <p:seq>
+              <p:cTn id="42" dur="indefinite" nodeType="mainSeq"/>
+              <p:prevCondLst>
+                <p:cond delay="0" evt="onPrev">
+                  <p:tgtEl>
+                    <p:sldTgt/>
+                  </p:tgtEl>
+                </p:cond>
+              </p:prevCondLst>
+              <p:nextCondLst>
+                <p:cond delay="0" evt="onNext">
+                  <p:tgtEl>
+                    <p:sldTgt/>
+                  </p:tgtEl>
+                </p:cond>
+              </p:nextCondLst>
+            </p:seq>
+          </p:childTnLst>
+        </p:cTn>
+      </p:par>
+    </p:tnLst>
+  </p:timing>
+</p:sld>
+</file>
+
+<file path=ppt/slides/slide22.xml><?xml version="1.0" encoding="utf-8"?>
+<p:sld xmlns:a="http://schemas.openxmlformats.org/drawingml/2006/main" xmlns:p="http://schemas.openxmlformats.org/presentationml/2006/main" xmlns:r="http://schemas.openxmlformats.org/officeDocument/2006/relationships" xmlns:p14="http://schemas.microsoft.com/office/powerpoint/2010/main" xmlns:p15="http://schemas.microsoft.com/office/powerpoint/2012/main" xmlns:mc="http://schemas.openxmlformats.org/markup-compatibility/2006">
+  <p:cSld>
+    <p:spTree>
+      <p:nvGrpSpPr>
+        <p:cNvPr id="1" name=""/>
+        <p:cNvGrpSpPr/>
+        <p:nvPr/>
+      </p:nvGrpSpPr>
+      <p:grpSpPr>
+        <a:xfrm>
+          <a:off x="0" y="0"/>
+          <a:ext cx="0" cy="0"/>
+          <a:chOff x="0" y="0"/>
+          <a:chExt cx="0" cy="0"/>
+        </a:xfrm>
+      </p:grpSpPr>
+      <p:sp>
+        <p:nvSpPr>
+          <p:cNvPr id="501" name="TextShape 1"/>
+          <p:cNvSpPr txBox="1"/>
+          <p:nvPr/>
+        </p:nvSpPr>
+        <p:spPr>
+          <a:xfrm>
+            <a:off x="539640" y="-94680"/>
+            <a:ext cx="8136720" cy="1295640"/>
+          </a:xfrm>
+          <a:prstGeom prst="rect">
+            <a:avLst/>
+          </a:prstGeom>
+          <a:noFill/>
+          <a:ln>
+            <a:noFill/>
+          </a:ln>
+        </p:spPr>
+        <p:txBody>
+          <a:bodyPr anchor="ctr">
+            <a:normAutofit/>
+          </a:bodyPr>
+          <a:p>
+            <a:pPr algn="ctr">
+              <a:lnSpc>
+                <a:spcPct val="100000"/>
+              </a:lnSpc>
+            </a:pPr>
+            <a:r>
+              <a:rPr b="0" lang="tr-TR" sz="4000" spc="-1" strike="noStrike">
+                <a:solidFill>
+                  <a:srgbClr val="ffffff"/>
+                </a:solidFill>
+                <a:latin typeface="Ubuntu"/>
+              </a:rPr>
+              <a:t>RDS – İlişkisel Veritabanları</a:t>
+            </a:r>
+            <a:endParaRPr b="0" lang="tr-TR" sz="4000" spc="-1" strike="noStrike">
+              <a:solidFill>
+                <a:srgbClr val="000000"/>
+              </a:solidFill>
+              <a:latin typeface="Calibri"/>
+            </a:endParaRPr>
+          </a:p>
+        </p:txBody>
+      </p:sp>
+      <p:sp>
+        <p:nvSpPr>
+          <p:cNvPr id="502" name="CustomShape 2"/>
+          <p:cNvSpPr/>
+          <p:nvPr/>
+        </p:nvSpPr>
+        <p:spPr>
+          <a:xfrm>
+            <a:off x="179640" y="2137320"/>
+            <a:ext cx="2448000" cy="2861640"/>
+          </a:xfrm>
+          <a:prstGeom prst="rect">
+            <a:avLst/>
+          </a:prstGeom>
+          <a:noFill/>
+          <a:ln>
+            <a:noFill/>
+          </a:ln>
+        </p:spPr>
+        <p:style>
+          <a:lnRef idx="0"/>
+          <a:fillRef idx="0"/>
+          <a:effectRef idx="0"/>
+          <a:fontRef idx="minor"/>
+        </p:style>
+      </p:sp>
+      <p:pic>
+        <p:nvPicPr>
+          <p:cNvPr id="503" name="Picture 24" descr=""/>
+          <p:cNvPicPr/>
+          <p:nvPr/>
+        </p:nvPicPr>
+        <p:blipFill>
+          <a:blip r:embed="rId1"/>
+          <a:stretch/>
+        </p:blipFill>
+        <p:spPr>
+          <a:xfrm>
+            <a:off x="939240" y="2468880"/>
+            <a:ext cx="706680" cy="817560"/>
+          </a:xfrm>
+          <a:prstGeom prst="rect">
+            <a:avLst/>
+          </a:prstGeom>
+          <a:ln>
+            <a:noFill/>
+          </a:ln>
+        </p:spPr>
+      </p:pic>
+      <p:sp>
+        <p:nvSpPr>
+          <p:cNvPr id="504" name="CustomShape 3"/>
+          <p:cNvSpPr/>
+          <p:nvPr/>
+        </p:nvSpPr>
+        <p:spPr>
+          <a:xfrm>
+            <a:off x="640080" y="3475800"/>
+            <a:ext cx="1247040" cy="606600"/>
+          </a:xfrm>
+          <a:prstGeom prst="rect">
+            <a:avLst/>
+          </a:prstGeom>
+          <a:noFill/>
+          <a:ln>
+            <a:noFill/>
+          </a:ln>
+        </p:spPr>
+        <p:style>
+          <a:lnRef idx="0"/>
+          <a:fillRef idx="0"/>
+          <a:effectRef idx="0"/>
+          <a:fontRef idx="minor"/>
+        </p:style>
+        <p:txBody>
+          <a:bodyPr lIns="90000" rIns="90000" tIns="45000" bIns="45000"/>
+          <a:p>
+            <a:pPr algn="ctr">
+              <a:lnSpc>
+                <a:spcPct val="100000"/>
+              </a:lnSpc>
+            </a:pPr>
+            <a:r>
+              <a:rPr b="0" lang="en-US" sz="2000" spc="-1" strike="noStrike">
+                <a:solidFill>
+                  <a:srgbClr val="000000"/>
+                </a:solidFill>
+                <a:latin typeface="Ubuntu"/>
+                <a:ea typeface="Amazon Ember"/>
+              </a:rPr>
+              <a:t>Amazon RDS</a:t>
+            </a:r>
+            <a:endParaRPr b="0" lang="en-US" sz="2000" spc="-1" strike="noStrike">
+              <a:latin typeface="Arial"/>
+            </a:endParaRPr>
+          </a:p>
+        </p:txBody>
+      </p:sp>
+      <p:sp>
+        <p:nvSpPr>
+          <p:cNvPr id="505" name="CustomShape 4"/>
+          <p:cNvSpPr/>
+          <p:nvPr/>
+        </p:nvSpPr>
+        <p:spPr>
+          <a:xfrm>
+            <a:off x="599400" y="1920240"/>
+            <a:ext cx="1412280" cy="271440"/>
+          </a:xfrm>
+          <a:prstGeom prst="rect">
+            <a:avLst/>
+          </a:prstGeom>
+          <a:noFill/>
+          <a:ln>
+            <a:noFill/>
+          </a:ln>
+        </p:spPr>
+        <p:style>
+          <a:lnRef idx="0"/>
+          <a:fillRef idx="0"/>
+          <a:effectRef idx="0"/>
+          <a:fontRef idx="minor"/>
+        </p:style>
+        <p:txBody>
+          <a:bodyPr lIns="90000" rIns="90000" tIns="45000" bIns="45000"/>
+          <a:p>
+            <a:pPr algn="ctr">
+              <a:lnSpc>
+                <a:spcPct val="100000"/>
+              </a:lnSpc>
+            </a:pPr>
+            <a:r>
+              <a:rPr b="0" lang="en-US" sz="2000" spc="-1" strike="noStrike">
+                <a:solidFill>
+                  <a:srgbClr val="000000"/>
+                </a:solidFill>
+                <a:latin typeface="Ubuntu"/>
+                <a:ea typeface="Amazon Ember"/>
+              </a:rPr>
+              <a:t>Relational</a:t>
+            </a:r>
+            <a:endParaRPr b="0" lang="en-US" sz="2000" spc="-1" strike="noStrike">
+              <a:latin typeface="Arial"/>
+            </a:endParaRPr>
+          </a:p>
+        </p:txBody>
+      </p:sp>
+      <p:sp>
+        <p:nvSpPr>
+          <p:cNvPr id="506" name="CustomShape 5"/>
+          <p:cNvSpPr/>
+          <p:nvPr/>
+        </p:nvSpPr>
+        <p:spPr>
+          <a:xfrm>
+            <a:off x="274320" y="1463040"/>
+            <a:ext cx="1973160" cy="3273120"/>
+          </a:xfrm>
+          <a:prstGeom prst="rect">
+            <a:avLst/>
+          </a:prstGeom>
+          <a:noFill/>
+          <a:ln w="50760">
+            <a:solidFill>
+              <a:srgbClr val="00599d"/>
+            </a:solidFill>
+            <a:round/>
+          </a:ln>
+        </p:spPr>
+        <p:style>
+          <a:lnRef idx="0"/>
+          <a:fillRef idx="0"/>
+          <a:effectRef idx="0"/>
+          <a:fontRef idx="minor"/>
+        </p:style>
+      </p:sp>
+      <p:sp>
+        <p:nvSpPr>
+          <p:cNvPr id="507" name="TextShape 6"/>
+          <p:cNvSpPr txBox="1"/>
+          <p:nvPr/>
+        </p:nvSpPr>
+        <p:spPr>
+          <a:xfrm>
+            <a:off x="2468880" y="1483920"/>
+            <a:ext cx="6492240" cy="2767320"/>
+          </a:xfrm>
+          <a:prstGeom prst="rect">
+            <a:avLst/>
+          </a:prstGeom>
+          <a:noFill/>
+          <a:ln>
+            <a:noFill/>
+          </a:ln>
+        </p:spPr>
+        <p:txBody>
+          <a:bodyPr lIns="90000" rIns="90000" tIns="45000" bIns="45000"/>
+          <a:p>
+            <a:pPr marL="216000" indent="-216000">
+              <a:buClr>
+                <a:srgbClr val="000000"/>
+              </a:buClr>
+              <a:buSzPct val="45000"/>
+              <a:buFont typeface="Wingdings" charset="2"/>
+              <a:buChar char=""/>
+            </a:pPr>
+            <a:r>
+              <a:rPr b="0" lang="en-US" sz="1600" spc="-1" strike="noStrike">
+                <a:latin typeface="Ubuntu"/>
+              </a:rPr>
+              <a:t>AWS içinde ilişkisel veritabanı kurmayı, çalıştırmayı ve ölçeklendirmeyi kolaylaştıran bir yönetilen hizmettir.</a:t>
+            </a:r>
+            <a:endParaRPr b="0" lang="en-US" sz="1600" spc="-1" strike="noStrike">
+              <a:latin typeface="Arial"/>
+            </a:endParaRPr>
+          </a:p>
+          <a:p>
+            <a:pPr marL="216000" indent="-216000">
+              <a:buClr>
+                <a:srgbClr val="000000"/>
+              </a:buClr>
+              <a:buSzPct val="45000"/>
+              <a:buFont typeface="Wingdings" charset="2"/>
+              <a:buChar char=""/>
+            </a:pPr>
+            <a:endParaRPr b="0" lang="en-US" sz="1600" spc="-1" strike="noStrike">
+              <a:latin typeface="Arial"/>
+            </a:endParaRPr>
+          </a:p>
+          <a:p>
+            <a:pPr marL="216000" indent="-216000">
+              <a:buClr>
+                <a:srgbClr val="000000"/>
+              </a:buClr>
+              <a:buSzPct val="45000"/>
+              <a:buFont typeface="Wingdings" charset="2"/>
+              <a:buChar char=""/>
+            </a:pPr>
+            <a:r>
+              <a:rPr b="0" lang="en-US" sz="1500" spc="-1" strike="noStrike">
+                <a:latin typeface="Ubuntu"/>
+              </a:rPr>
+              <a:t>Dakikalar içinde yeni veritabanı sunucuları ayaklandırabiliriz. </a:t>
+            </a:r>
+            <a:endParaRPr b="0" lang="en-US" sz="1500" spc="-1" strike="noStrike">
+              <a:latin typeface="Arial"/>
+            </a:endParaRPr>
+          </a:p>
+          <a:p>
+            <a:pPr marL="216000" indent="-216000">
+              <a:buClr>
+                <a:srgbClr val="000000"/>
+              </a:buClr>
+              <a:buSzPct val="45000"/>
+              <a:buFont typeface="Wingdings" charset="2"/>
+              <a:buChar char=""/>
+            </a:pPr>
+            <a:endParaRPr b="0" lang="en-US" sz="1500" spc="-1" strike="noStrike">
+              <a:latin typeface="Arial"/>
+            </a:endParaRPr>
+          </a:p>
+          <a:p>
+            <a:pPr marL="216000" indent="-216000">
+              <a:buClr>
+                <a:srgbClr val="000000"/>
+              </a:buClr>
+              <a:buSzPct val="45000"/>
+              <a:buFont typeface="Wingdings" charset="2"/>
+              <a:buChar char=""/>
+            </a:pPr>
+            <a:r>
+              <a:rPr b="0" lang="en-US" sz="1600" spc="-1" strike="noStrike">
+                <a:latin typeface="Ubuntu"/>
+              </a:rPr>
+              <a:t>Fully managed bir servistir. Yeniden boyutlandırılabilen kapasite sağlamasının yanı sıra zaman alan veritabanı yönetim görevlerini yönetir.</a:t>
+            </a:r>
+            <a:endParaRPr b="0" lang="en-US" sz="1600" spc="-1" strike="noStrike">
+              <a:latin typeface="Arial"/>
+            </a:endParaRPr>
+          </a:p>
+          <a:p>
+            <a:pPr marL="216000" indent="-216000">
+              <a:buClr>
+                <a:srgbClr val="000000"/>
+              </a:buClr>
+              <a:buSzPct val="45000"/>
+              <a:buFont typeface="Wingdings" charset="2"/>
+              <a:buChar char=""/>
+            </a:pPr>
+            <a:endParaRPr b="0" lang="en-US" sz="1600" spc="-1" strike="noStrike">
+              <a:latin typeface="Arial"/>
+            </a:endParaRPr>
+          </a:p>
+          <a:p>
+            <a:pPr marL="216000" indent="-216000">
+              <a:buClr>
+                <a:srgbClr val="000000"/>
+              </a:buClr>
+              <a:buSzPct val="45000"/>
+              <a:buFont typeface="Wingdings" charset="2"/>
+              <a:buChar char=""/>
+            </a:pPr>
+            <a:r>
+              <a:rPr b="0" lang="en-US" sz="1600" spc="-1" strike="noStrike">
+                <a:latin typeface="Ubuntu"/>
+              </a:rPr>
+              <a:t>MySQL, MariaDB, Oracle, SQL Server veya PostgreSQL veritabanlarını destekler.</a:t>
+            </a:r>
+            <a:endParaRPr b="0" lang="en-US" sz="1600" spc="-1" strike="noStrike">
+              <a:latin typeface="Arial"/>
+            </a:endParaRPr>
+          </a:p>
+          <a:p>
+            <a:pPr marL="216000" indent="-216000">
+              <a:buClr>
+                <a:srgbClr val="000000"/>
+              </a:buClr>
+              <a:buSzPct val="45000"/>
+              <a:buFont typeface="Wingdings" charset="2"/>
+              <a:buChar char=""/>
+            </a:pPr>
+            <a:endParaRPr b="0" lang="en-US" sz="1600" spc="-1" strike="noStrike">
+              <a:latin typeface="Arial"/>
+            </a:endParaRPr>
+          </a:p>
+        </p:txBody>
+      </p:sp>
+    </p:spTree>
+  </p:cSld>
+  <p:transition spd="slow">
+    <p:push dir="u"/>
+  </p:transition>
+  <p:timing>
+    <p:tnLst>
+      <p:par>
+        <p:cTn id="43" dur="indefinite" restart="never" nodeType="tmRoot">
+          <p:childTnLst>
+            <p:seq>
+              <p:cTn id="44" dur="indefinite" nodeType="mainSeq"/>
+              <p:prevCondLst>
+                <p:cond delay="0" evt="onPrev">
+                  <p:tgtEl>
+                    <p:sldTgt/>
+                  </p:tgtEl>
+                </p:cond>
+              </p:prevCondLst>
+              <p:nextCondLst>
+                <p:cond delay="0" evt="onNext">
+                  <p:tgtEl>
+                    <p:sldTgt/>
+                  </p:tgtEl>
+                </p:cond>
+              </p:nextCondLst>
+            </p:seq>
+          </p:childTnLst>
+        </p:cTn>
+      </p:par>
+    </p:tnLst>
+  </p:timing>
+</p:sld>
+</file>
+
+<file path=ppt/slides/slide23.xml><?xml version="1.0" encoding="utf-8"?>
+<p:sld xmlns:a="http://schemas.openxmlformats.org/drawingml/2006/main" xmlns:p="http://schemas.openxmlformats.org/presentationml/2006/main" xmlns:r="http://schemas.openxmlformats.org/officeDocument/2006/relationships" xmlns:p14="http://schemas.microsoft.com/office/powerpoint/2010/main" xmlns:p15="http://schemas.microsoft.com/office/powerpoint/2012/main" xmlns:mc="http://schemas.openxmlformats.org/markup-compatibility/2006">
+  <p:cSld>
+    <p:spTree>
+      <p:nvGrpSpPr>
+        <p:cNvPr id="1" name=""/>
+        <p:cNvGrpSpPr/>
+        <p:nvPr/>
+      </p:nvGrpSpPr>
+      <p:grpSpPr>
+        <a:xfrm>
+          <a:off x="0" y="0"/>
+          <a:ext cx="0" cy="0"/>
+          <a:chOff x="0" y="0"/>
+          <a:chExt cx="0" cy="0"/>
+        </a:xfrm>
+      </p:grpSpPr>
+      <p:sp>
+        <p:nvSpPr>
+          <p:cNvPr id="508" name="TextShape 1"/>
+          <p:cNvSpPr txBox="1"/>
+          <p:nvPr/>
+        </p:nvSpPr>
+        <p:spPr>
+          <a:xfrm>
+            <a:off x="539640" y="-94680"/>
+            <a:ext cx="8136720" cy="1295640"/>
+          </a:xfrm>
+          <a:prstGeom prst="rect">
+            <a:avLst/>
+          </a:prstGeom>
+          <a:noFill/>
+          <a:ln>
+            <a:noFill/>
+          </a:ln>
+        </p:spPr>
+        <p:txBody>
+          <a:bodyPr anchor="ctr">
+            <a:normAutofit/>
+          </a:bodyPr>
+          <a:p>
+            <a:pPr algn="ctr">
+              <a:lnSpc>
+                <a:spcPct val="100000"/>
+              </a:lnSpc>
+            </a:pPr>
+            <a:r>
+              <a:rPr b="0" lang="tr-TR" sz="4000" spc="-1" strike="noStrike">
+                <a:solidFill>
+                  <a:srgbClr val="ffffff"/>
+                </a:solidFill>
+                <a:latin typeface="Ubuntu"/>
+              </a:rPr>
+              <a:t>DEMO</a:t>
+            </a:r>
+            <a:endParaRPr b="0" lang="tr-TR" sz="4000" spc="-1" strike="noStrike">
+              <a:solidFill>
+                <a:srgbClr val="000000"/>
+              </a:solidFill>
+              <a:latin typeface="Calibri"/>
+            </a:endParaRPr>
+          </a:p>
+        </p:txBody>
+      </p:sp>
+      <p:sp>
+        <p:nvSpPr>
+          <p:cNvPr id="509" name="CustomShape 2"/>
+          <p:cNvSpPr/>
+          <p:nvPr/>
+        </p:nvSpPr>
+        <p:spPr>
+          <a:xfrm>
+            <a:off x="179640" y="2137320"/>
+            <a:ext cx="2448000" cy="2861640"/>
+          </a:xfrm>
+          <a:prstGeom prst="rect">
+            <a:avLst/>
+          </a:prstGeom>
+          <a:noFill/>
+          <a:ln>
+            <a:noFill/>
+          </a:ln>
+        </p:spPr>
+        <p:style>
+          <a:lnRef idx="0"/>
+          <a:fillRef idx="0"/>
+          <a:effectRef idx="0"/>
+          <a:fontRef idx="minor"/>
+        </p:style>
+      </p:sp>
       <p:grpSp>
         <p:nvGrpSpPr>
-          <p:cNvPr id="497" name="Group 3"/>
+          <p:cNvPr id="510" name="Group 3"/>
           <p:cNvGrpSpPr/>
           <p:nvPr/>
         </p:nvGrpSpPr>
@@ -21039,7 +21951,7 @@
         </p:grpSpPr>
         <p:sp>
           <p:nvSpPr>
-            <p:cNvPr id="498" name="Line 4"/>
+            <p:cNvPr id="511" name="Line 4"/>
             <p:cNvSpPr/>
             <p:nvPr/>
           </p:nvSpPr>
@@ -21070,7 +21982,7 @@
         </p:sp>
         <p:sp>
           <p:nvSpPr>
-            <p:cNvPr id="499" name="CustomShape 5"/>
+            <p:cNvPr id="512" name="CustomShape 5"/>
             <p:cNvSpPr/>
             <p:nvPr/>
           </p:nvSpPr>
@@ -21108,7 +22020,7 @@
         </p:sp>
         <p:sp>
           <p:nvSpPr>
-            <p:cNvPr id="500" name="CustomShape 6"/>
+            <p:cNvPr id="513" name="CustomShape 6"/>
             <p:cNvSpPr/>
             <p:nvPr/>
           </p:nvSpPr>
@@ -21157,7 +22069,7 @@
         </p:sp>
         <p:pic>
           <p:nvPicPr>
-            <p:cNvPr id="501" name="Picture 6" descr=""/>
+            <p:cNvPr id="514" name="Picture 6" descr=""/>
             <p:cNvPicPr/>
             <p:nvPr/>
           </p:nvPicPr>
@@ -21180,7 +22092,7 @@
         </p:pic>
         <p:sp>
           <p:nvSpPr>
-            <p:cNvPr id="502" name="CustomShape 7"/>
+            <p:cNvPr id="515" name="CustomShape 7"/>
             <p:cNvSpPr/>
             <p:nvPr/>
           </p:nvSpPr>
@@ -21221,7 +22133,7 @@
         </p:sp>
         <p:sp>
           <p:nvSpPr>
-            <p:cNvPr id="503" name="CustomShape 8"/>
+            <p:cNvPr id="516" name="CustomShape 8"/>
             <p:cNvSpPr/>
             <p:nvPr/>
           </p:nvSpPr>
@@ -21270,7 +22182,7 @@
         </p:sp>
         <p:sp>
           <p:nvSpPr>
-            <p:cNvPr id="504" name="CustomShape 9"/>
+            <p:cNvPr id="517" name="CustomShape 9"/>
             <p:cNvSpPr/>
             <p:nvPr/>
           </p:nvSpPr>
@@ -21308,7 +22220,7 @@
         </p:sp>
         <p:sp>
           <p:nvSpPr>
-            <p:cNvPr id="505" name="CustomShape 10"/>
+            <p:cNvPr id="518" name="CustomShape 10"/>
             <p:cNvSpPr/>
             <p:nvPr/>
           </p:nvSpPr>
@@ -21377,7 +22289,7 @@
         </p:sp>
         <p:pic>
           <p:nvPicPr>
-            <p:cNvPr id="506" name="Picture 11" descr=""/>
+            <p:cNvPr id="519" name="Picture 11" descr=""/>
             <p:cNvPicPr/>
             <p:nvPr/>
           </p:nvPicPr>
@@ -21400,7 +22312,7 @@
         </p:pic>
         <p:sp>
           <p:nvSpPr>
-            <p:cNvPr id="507" name="CustomShape 11"/>
+            <p:cNvPr id="520" name="CustomShape 11"/>
             <p:cNvSpPr/>
             <p:nvPr/>
           </p:nvSpPr>
@@ -21438,7 +22350,7 @@
         </p:sp>
         <p:sp>
           <p:nvSpPr>
-            <p:cNvPr id="508" name="CustomShape 12"/>
+            <p:cNvPr id="521" name="CustomShape 12"/>
             <p:cNvSpPr/>
             <p:nvPr/>
           </p:nvSpPr>
@@ -21507,7 +22419,7 @@
         </p:sp>
         <p:pic>
           <p:nvPicPr>
-            <p:cNvPr id="509" name="Picture 14" descr=""/>
+            <p:cNvPr id="522" name="Picture 14" descr=""/>
             <p:cNvPicPr/>
             <p:nvPr/>
           </p:nvPicPr>
@@ -21530,7 +22442,7 @@
         </p:pic>
         <p:pic>
           <p:nvPicPr>
-            <p:cNvPr id="510" name="Picture 16" descr=""/>
+            <p:cNvPr id="523" name="Picture 16" descr=""/>
             <p:cNvPicPr/>
             <p:nvPr/>
           </p:nvPicPr>
@@ -21553,7 +22465,7 @@
         </p:pic>
         <p:sp>
           <p:nvSpPr>
-            <p:cNvPr id="511" name="CustomShape 13"/>
+            <p:cNvPr id="524" name="CustomShape 13"/>
             <p:cNvSpPr/>
             <p:nvPr/>
           </p:nvSpPr>
@@ -21602,7 +22514,7 @@
         </p:sp>
         <p:pic>
           <p:nvPicPr>
-            <p:cNvPr id="512" name="Picture 18" descr=""/>
+            <p:cNvPr id="525" name="Picture 18" descr=""/>
             <p:cNvPicPr/>
             <p:nvPr/>
           </p:nvPicPr>
@@ -21625,7 +22537,7 @@
         </p:pic>
         <p:sp>
           <p:nvSpPr>
-            <p:cNvPr id="513" name="CustomShape 14"/>
+            <p:cNvPr id="526" name="CustomShape 14"/>
             <p:cNvSpPr/>
             <p:nvPr/>
           </p:nvSpPr>
@@ -21694,7 +22606,7 @@
         </p:sp>
         <p:pic>
           <p:nvPicPr>
-            <p:cNvPr id="514" name="Picture 125" descr=""/>
+            <p:cNvPr id="527" name="Picture 125" descr=""/>
             <p:cNvPicPr/>
             <p:nvPr/>
           </p:nvPicPr>
@@ -21717,7 +22629,7 @@
         </p:pic>
         <p:sp>
           <p:nvSpPr>
-            <p:cNvPr id="515" name="Line 15"/>
+            <p:cNvPr id="528" name="Line 15"/>
             <p:cNvSpPr/>
             <p:nvPr/>
           </p:nvSpPr>
@@ -21749,7 +22661,7 @@
       </p:grpSp>
       <p:sp>
         <p:nvSpPr>
-          <p:cNvPr id="516" name="CustomShape 16"/>
+          <p:cNvPr id="529" name="CustomShape 16"/>
           <p:cNvSpPr/>
           <p:nvPr/>
         </p:nvSpPr>
@@ -21992,10 +22904,10 @@
   <p:timing>
     <p:tnLst>
       <p:par>
-        <p:cTn id="41" dur="indefinite" restart="never" nodeType="tmRoot">
+        <p:cTn id="45" dur="indefinite" restart="never" nodeType="tmRoot">
           <p:childTnLst>
             <p:seq>
-              <p:cTn id="42" dur="indefinite" nodeType="mainSeq"/>
+              <p:cTn id="46" dur="indefinite" nodeType="mainSeq"/>
               <p:prevCondLst>
                 <p:cond delay="0" evt="onPrev">
                   <p:tgtEl>
@@ -22019,7 +22931,7 @@
 </p:sld>
 </file>
 
-<file path=ppt/slides/slide22.xml><?xml version="1.0" encoding="utf-8"?>
+<file path=ppt/slides/slide24.xml><?xml version="1.0" encoding="utf-8"?>
 <p:sld xmlns:a="http://schemas.openxmlformats.org/drawingml/2006/main" xmlns:p="http://schemas.openxmlformats.org/presentationml/2006/main" xmlns:r="http://schemas.openxmlformats.org/officeDocument/2006/relationships" xmlns:p14="http://schemas.microsoft.com/office/powerpoint/2010/main" xmlns:p15="http://schemas.microsoft.com/office/powerpoint/2012/main" xmlns:mc="http://schemas.openxmlformats.org/markup-compatibility/2006">
   <p:cSld>
     <p:spTree>
@@ -22038,7 +22950,7 @@
       </p:grpSpPr>
       <p:sp>
         <p:nvSpPr>
-          <p:cNvPr id="517" name="TextShape 1"/>
+          <p:cNvPr id="530" name="TextShape 1"/>
           <p:cNvSpPr txBox="1"/>
           <p:nvPr/>
         </p:nvSpPr>
@@ -22085,7 +22997,7 @@
       </p:sp>
       <p:sp>
         <p:nvSpPr>
-          <p:cNvPr id="518" name="CustomShape 2"/>
+          <p:cNvPr id="531" name="CustomShape 2"/>
           <p:cNvSpPr/>
           <p:nvPr/>
         </p:nvSpPr>
@@ -22111,7 +23023,7 @@
       </p:sp>
       <p:pic>
         <p:nvPicPr>
-          <p:cNvPr id="519" name="Picture 2" descr=""/>
+          <p:cNvPr id="532" name="Picture 2" descr=""/>
           <p:cNvPicPr/>
           <p:nvPr/>
         </p:nvPicPr>
@@ -22134,7 +23046,7 @@
       </p:pic>
       <p:sp>
         <p:nvSpPr>
-          <p:cNvPr id="520" name="TextShape 3"/>
+          <p:cNvPr id="533" name="TextShape 3"/>
           <p:cNvSpPr txBox="1"/>
           <p:nvPr/>
         </p:nvSpPr>
@@ -22272,10 +23184,10 @@
   <p:timing>
     <p:tnLst>
       <p:par>
-        <p:cTn id="43" dur="indefinite" restart="never" nodeType="tmRoot">
+        <p:cTn id="47" dur="indefinite" restart="never" nodeType="tmRoot">
           <p:childTnLst>
             <p:seq>
-              <p:cTn id="44" dur="indefinite" nodeType="mainSeq"/>
+              <p:cTn id="48" dur="indefinite" nodeType="mainSeq"/>
               <p:prevCondLst>
                 <p:cond delay="0" evt="onPrev">
                   <p:tgtEl>
@@ -22380,8 +23292,8 @@
         </p:nvSpPr>
         <p:spPr>
           <a:xfrm>
-            <a:off x="238320" y="1828800"/>
-            <a:ext cx="8631360" cy="2676240"/>
+            <a:off x="267480" y="1614960"/>
+            <a:ext cx="8631360" cy="3013200"/>
           </a:xfrm>
           <a:prstGeom prst="rect">
             <a:avLst/>
@@ -22541,7 +23453,29 @@
               <a:rPr b="0" lang="en-US" sz="1600" spc="-1" strike="noStrike">
                 <a:latin typeface="Ubuntu"/>
               </a:rPr>
-              <a:t>EC2 Instances </a:t>
+              <a:t>IAM Groups &amp; Users &amp; Roles</a:t>
+            </a:r>
+            <a:endParaRPr b="0" lang="en-US" sz="1600" spc="-1" strike="noStrike">
+              <a:latin typeface="Arial"/>
+            </a:endParaRPr>
+          </a:p>
+          <a:p>
+            <a:pPr marL="216000" indent="-216000">
+              <a:spcAft>
+                <a:spcPts val="865"/>
+              </a:spcAft>
+              <a:buClr>
+                <a:srgbClr val="000000"/>
+              </a:buClr>
+              <a:buSzPct val="45000"/>
+              <a:buFont typeface="Wingdings" charset="2"/>
+              <a:buChar char=""/>
+            </a:pPr>
+            <a:r>
+              <a:rPr b="0" lang="en-US" sz="1600" spc="-1" strike="noStrike">
+                <a:latin typeface="Ubuntu"/>
+              </a:rPr>
+              <a:t>EC2 Instances &amp; User Data &amp; Key Pairs </a:t>
             </a:r>
             <a:endParaRPr b="0" lang="en-US" sz="1600" spc="-1" strike="noStrike">
               <a:latin typeface="Arial"/>

</xml_diff>